<commit_message>
Adding September main video
</commit_message>
<xml_diff>
--- a/2024/2024Thumbnail.pptx
+++ b/2024/2024Thumbnail.pptx
@@ -9,6 +9,7 @@
     <p:sldId id="275" r:id="rId3"/>
     <p:sldId id="276" r:id="rId4"/>
     <p:sldId id="277" r:id="rId5"/>
+    <p:sldId id="278" r:id="rId6"/>
   </p:sldIdLst>
   <p:sldSz cx="12192000" cy="6858000"/>
   <p:notesSz cx="6858000" cy="9144000"/>
@@ -262,7 +263,7 @@
           <a:p>
             <a:fld id="{3816CC03-B68F-4642-A2B8-7A8633A67F21}" type="datetimeFigureOut">
               <a:rPr lang="en-US" smtClean="0"/>
-              <a:t>7/30/2024</a:t>
+              <a:t>8/26/2024</a:t>
             </a:fld>
             <a:endParaRPr lang="en-US"/>
           </a:p>
@@ -460,7 +461,7 @@
           <a:p>
             <a:fld id="{3816CC03-B68F-4642-A2B8-7A8633A67F21}" type="datetimeFigureOut">
               <a:rPr lang="en-US" smtClean="0"/>
-              <a:t>7/30/2024</a:t>
+              <a:t>8/26/2024</a:t>
             </a:fld>
             <a:endParaRPr lang="en-US"/>
           </a:p>
@@ -668,7 +669,7 @@
           <a:p>
             <a:fld id="{3816CC03-B68F-4642-A2B8-7A8633A67F21}" type="datetimeFigureOut">
               <a:rPr lang="en-US" smtClean="0"/>
-              <a:t>7/30/2024</a:t>
+              <a:t>8/26/2024</a:t>
             </a:fld>
             <a:endParaRPr lang="en-US"/>
           </a:p>
@@ -866,7 +867,7 @@
           <a:p>
             <a:fld id="{3816CC03-B68F-4642-A2B8-7A8633A67F21}" type="datetimeFigureOut">
               <a:rPr lang="en-US" smtClean="0"/>
-              <a:t>7/30/2024</a:t>
+              <a:t>8/26/2024</a:t>
             </a:fld>
             <a:endParaRPr lang="en-US"/>
           </a:p>
@@ -1141,7 +1142,7 @@
           <a:p>
             <a:fld id="{3816CC03-B68F-4642-A2B8-7A8633A67F21}" type="datetimeFigureOut">
               <a:rPr lang="en-US" smtClean="0"/>
-              <a:t>7/30/2024</a:t>
+              <a:t>8/26/2024</a:t>
             </a:fld>
             <a:endParaRPr lang="en-US"/>
           </a:p>
@@ -1406,7 +1407,7 @@
           <a:p>
             <a:fld id="{3816CC03-B68F-4642-A2B8-7A8633A67F21}" type="datetimeFigureOut">
               <a:rPr lang="en-US" smtClean="0"/>
-              <a:t>7/30/2024</a:t>
+              <a:t>8/26/2024</a:t>
             </a:fld>
             <a:endParaRPr lang="en-US"/>
           </a:p>
@@ -1818,7 +1819,7 @@
           <a:p>
             <a:fld id="{3816CC03-B68F-4642-A2B8-7A8633A67F21}" type="datetimeFigureOut">
               <a:rPr lang="en-US" smtClean="0"/>
-              <a:t>7/30/2024</a:t>
+              <a:t>8/26/2024</a:t>
             </a:fld>
             <a:endParaRPr lang="en-US"/>
           </a:p>
@@ -1959,7 +1960,7 @@
           <a:p>
             <a:fld id="{3816CC03-B68F-4642-A2B8-7A8633A67F21}" type="datetimeFigureOut">
               <a:rPr lang="en-US" smtClean="0"/>
-              <a:t>7/30/2024</a:t>
+              <a:t>8/26/2024</a:t>
             </a:fld>
             <a:endParaRPr lang="en-US"/>
           </a:p>
@@ -2072,7 +2073,7 @@
           <a:p>
             <a:fld id="{3816CC03-B68F-4642-A2B8-7A8633A67F21}" type="datetimeFigureOut">
               <a:rPr lang="en-US" smtClean="0"/>
-              <a:t>7/30/2024</a:t>
+              <a:t>8/26/2024</a:t>
             </a:fld>
             <a:endParaRPr lang="en-US"/>
           </a:p>
@@ -2455,7 +2456,7 @@
           <a:p>
             <a:fld id="{3816CC03-B68F-4642-A2B8-7A8633A67F21}" type="datetimeFigureOut">
               <a:rPr lang="en-US" smtClean="0"/>
-              <a:t>7/30/2024</a:t>
+              <a:t>8/26/2024</a:t>
             </a:fld>
             <a:endParaRPr lang="en-US"/>
           </a:p>
@@ -2743,7 +2744,7 @@
           <a:p>
             <a:fld id="{3816CC03-B68F-4642-A2B8-7A8633A67F21}" type="datetimeFigureOut">
               <a:rPr lang="en-US" smtClean="0"/>
-              <a:t>7/30/2024</a:t>
+              <a:t>8/26/2024</a:t>
             </a:fld>
             <a:endParaRPr lang="en-US"/>
           </a:p>
@@ -2984,7 +2985,7 @@
           <a:p>
             <a:fld id="{3816CC03-B68F-4642-A2B8-7A8633A67F21}" type="datetimeFigureOut">
               <a:rPr lang="en-US" smtClean="0"/>
-              <a:t>7/30/2024</a:t>
+              <a:t>8/26/2024</a:t>
             </a:fld>
             <a:endParaRPr lang="en-US"/>
           </a:p>
@@ -7903,8 +7904,8 @@
           </p:style>
         </p:cxnSp>
       </p:grpSp>
-      <mc:AlternateContent xmlns:mc="http://schemas.openxmlformats.org/markup-compatibility/2006">
-        <mc:Choice xmlns:a14="http://schemas.microsoft.com/office/drawing/2010/main" Requires="a14">
+      <mc:AlternateContent xmlns:mc="http://schemas.openxmlformats.org/markup-compatibility/2006" xmlns:a14="http://schemas.microsoft.com/office/drawing/2010/main">
+        <mc:Choice Requires="a14">
           <p:sp>
             <p:nvSpPr>
               <p:cNvPr id="18" name="TextBox 17">
@@ -8094,7 +8095,7 @@
             </p:txBody>
           </p:sp>
         </mc:Choice>
-        <mc:Fallback>
+        <mc:Fallback xmlns="">
           <p:sp>
             <p:nvSpPr>
               <p:cNvPr id="18" name="TextBox 17">
@@ -9608,8 +9609,8 @@
               <a:chExt cx="1126421" cy="1149812"/>
             </a:xfrm>
           </p:grpSpPr>
-          <mc:AlternateContent xmlns:mc="http://schemas.openxmlformats.org/markup-compatibility/2006">
-            <mc:Choice xmlns:a14="http://schemas.microsoft.com/office/drawing/2010/main" Requires="a14">
+          <mc:AlternateContent xmlns:mc="http://schemas.openxmlformats.org/markup-compatibility/2006" xmlns:a14="http://schemas.microsoft.com/office/drawing/2010/main">
+            <mc:Choice Requires="a14">
               <p:sp>
                 <p:nvSpPr>
                   <p:cNvPr id="72" name="TextBox 71">
@@ -9671,7 +9672,7 @@
                 </p:txBody>
               </p:sp>
             </mc:Choice>
-            <mc:Fallback>
+            <mc:Fallback xmlns="">
               <p:sp>
                 <p:nvSpPr>
                   <p:cNvPr id="72" name="TextBox 71">
@@ -9716,8 +9717,8 @@
               </p:sp>
             </mc:Fallback>
           </mc:AlternateContent>
-          <mc:AlternateContent xmlns:mc="http://schemas.openxmlformats.org/markup-compatibility/2006">
-            <mc:Choice xmlns:a14="http://schemas.microsoft.com/office/drawing/2010/main" Requires="a14">
+          <mc:AlternateContent xmlns:mc="http://schemas.openxmlformats.org/markup-compatibility/2006" xmlns:a14="http://schemas.microsoft.com/office/drawing/2010/main">
+            <mc:Choice Requires="a14">
               <p:sp>
                 <p:nvSpPr>
                   <p:cNvPr id="73" name="TextBox 72">
@@ -9779,7 +9780,7 @@
                 </p:txBody>
               </p:sp>
             </mc:Choice>
-            <mc:Fallback>
+            <mc:Fallback xmlns="">
               <p:sp>
                 <p:nvSpPr>
                   <p:cNvPr id="73" name="TextBox 72">
@@ -10047,8 +10048,8 @@
               </p:txBody>
             </p:sp>
           </p:grpSp>
-          <mc:AlternateContent xmlns:mc="http://schemas.openxmlformats.org/markup-compatibility/2006">
-            <mc:Choice xmlns:a14="http://schemas.microsoft.com/office/drawing/2010/main" Requires="a14">
+          <mc:AlternateContent xmlns:mc="http://schemas.openxmlformats.org/markup-compatibility/2006" xmlns:a14="http://schemas.microsoft.com/office/drawing/2010/main">
+            <mc:Choice Requires="a14">
               <p:sp>
                 <p:nvSpPr>
                   <p:cNvPr id="75" name="TextBox 74">
@@ -10152,7 +10153,7 @@
                 </p:txBody>
               </p:sp>
             </mc:Choice>
-            <mc:Fallback>
+            <mc:Fallback xmlns="">
               <p:sp>
                 <p:nvSpPr>
                   <p:cNvPr id="75" name="TextBox 74">
@@ -10441,8 +10442,8 @@
               </p:txBody>
             </p:sp>
           </p:grpSp>
-          <mc:AlternateContent xmlns:mc="http://schemas.openxmlformats.org/markup-compatibility/2006">
-            <mc:Choice xmlns:a14="http://schemas.microsoft.com/office/drawing/2010/main" Requires="a14">
+          <mc:AlternateContent xmlns:mc="http://schemas.openxmlformats.org/markup-compatibility/2006" xmlns:a14="http://schemas.microsoft.com/office/drawing/2010/main">
+            <mc:Choice Requires="a14">
               <p:sp>
                 <p:nvSpPr>
                   <p:cNvPr id="82" name="TextBox 81">
@@ -10492,7 +10493,7 @@
                 </p:txBody>
               </p:sp>
             </mc:Choice>
-            <mc:Fallback>
+            <mc:Fallback xmlns="">
               <p:sp>
                 <p:nvSpPr>
                   <p:cNvPr id="82" name="TextBox 81">
@@ -10537,8 +10538,8 @@
               </p:sp>
             </mc:Fallback>
           </mc:AlternateContent>
-          <mc:AlternateContent xmlns:mc="http://schemas.openxmlformats.org/markup-compatibility/2006">
-            <mc:Choice xmlns:a14="http://schemas.microsoft.com/office/drawing/2010/main" Requires="a14">
+          <mc:AlternateContent xmlns:mc="http://schemas.openxmlformats.org/markup-compatibility/2006" xmlns:a14="http://schemas.microsoft.com/office/drawing/2010/main">
+            <mc:Choice Requires="a14">
               <p:sp>
                 <p:nvSpPr>
                   <p:cNvPr id="83" name="TextBox 82">
@@ -10588,7 +10589,7 @@
                 </p:txBody>
               </p:sp>
             </mc:Choice>
-            <mc:Fallback>
+            <mc:Fallback xmlns="">
               <p:sp>
                 <p:nvSpPr>
                   <p:cNvPr id="83" name="TextBox 82">
@@ -10633,8 +10634,8 @@
               </p:sp>
             </mc:Fallback>
           </mc:AlternateContent>
-          <mc:AlternateContent xmlns:mc="http://schemas.openxmlformats.org/markup-compatibility/2006">
-            <mc:Choice xmlns:a14="http://schemas.microsoft.com/office/drawing/2010/main" Requires="a14">
+          <mc:AlternateContent xmlns:mc="http://schemas.openxmlformats.org/markup-compatibility/2006" xmlns:a14="http://schemas.microsoft.com/office/drawing/2010/main">
+            <mc:Choice Requires="a14">
               <p:sp>
                 <p:nvSpPr>
                   <p:cNvPr id="84" name="TextBox 83">
@@ -10714,7 +10715,7 @@
                 </p:txBody>
               </p:sp>
             </mc:Choice>
-            <mc:Fallback>
+            <mc:Fallback xmlns="">
               <p:sp>
                 <p:nvSpPr>
                   <p:cNvPr id="84" name="TextBox 83">
@@ -10780,8 +10781,8 @@
               <a:chExt cx="3333866" cy="3655255"/>
             </a:xfrm>
           </p:grpSpPr>
-          <mc:AlternateContent xmlns:mc="http://schemas.openxmlformats.org/markup-compatibility/2006">
-            <mc:Choice xmlns:a14="http://schemas.microsoft.com/office/drawing/2010/main" Requires="a14">
+          <mc:AlternateContent xmlns:mc="http://schemas.openxmlformats.org/markup-compatibility/2006" xmlns:a14="http://schemas.microsoft.com/office/drawing/2010/main">
+            <mc:Choice Requires="a14">
               <p:sp>
                 <p:nvSpPr>
                   <p:cNvPr id="90" name="TextBox 89">
@@ -10831,7 +10832,7 @@
                 </p:txBody>
               </p:sp>
             </mc:Choice>
-            <mc:Fallback>
+            <mc:Fallback xmlns="">
               <p:sp>
                 <p:nvSpPr>
                   <p:cNvPr id="90" name="TextBox 89">
@@ -10876,8 +10877,8 @@
               </p:sp>
             </mc:Fallback>
           </mc:AlternateContent>
-          <mc:AlternateContent xmlns:mc="http://schemas.openxmlformats.org/markup-compatibility/2006">
-            <mc:Choice xmlns:a14="http://schemas.microsoft.com/office/drawing/2010/main" Requires="a14">
+          <mc:AlternateContent xmlns:mc="http://schemas.openxmlformats.org/markup-compatibility/2006" xmlns:a14="http://schemas.microsoft.com/office/drawing/2010/main">
+            <mc:Choice Requires="a14">
               <p:sp>
                 <p:nvSpPr>
                   <p:cNvPr id="91" name="TextBox 90">
@@ -10927,7 +10928,7 @@
                 </p:txBody>
               </p:sp>
             </mc:Choice>
-            <mc:Fallback>
+            <mc:Fallback xmlns="">
               <p:sp>
                 <p:nvSpPr>
                   <p:cNvPr id="91" name="TextBox 90">
@@ -11143,8 +11144,8 @@
               </a:fontRef>
             </p:style>
           </p:cxnSp>
-          <mc:AlternateContent xmlns:mc="http://schemas.openxmlformats.org/markup-compatibility/2006">
-            <mc:Choice xmlns:a14="http://schemas.microsoft.com/office/drawing/2010/main" Requires="a14">
+          <mc:AlternateContent xmlns:mc="http://schemas.openxmlformats.org/markup-compatibility/2006" xmlns:a14="http://schemas.microsoft.com/office/drawing/2010/main">
+            <mc:Choice Requires="a14">
               <p:sp>
                 <p:nvSpPr>
                   <p:cNvPr id="170" name="TextBox 169">
@@ -11194,7 +11195,7 @@
                 </p:txBody>
               </p:sp>
             </mc:Choice>
-            <mc:Fallback>
+            <mc:Fallback xmlns="">
               <p:sp>
                 <p:nvSpPr>
                   <p:cNvPr id="170" name="TextBox 169">
@@ -11239,8 +11240,8 @@
               </p:sp>
             </mc:Fallback>
           </mc:AlternateContent>
-          <mc:AlternateContent xmlns:mc="http://schemas.openxmlformats.org/markup-compatibility/2006">
-            <mc:Choice xmlns:a14="http://schemas.microsoft.com/office/drawing/2010/main" Requires="a14">
+          <mc:AlternateContent xmlns:mc="http://schemas.openxmlformats.org/markup-compatibility/2006" xmlns:a14="http://schemas.microsoft.com/office/drawing/2010/main">
+            <mc:Choice Requires="a14">
               <p:sp>
                 <p:nvSpPr>
                   <p:cNvPr id="171" name="TextBox 170">
@@ -11290,7 +11291,7 @@
                 </p:txBody>
               </p:sp>
             </mc:Choice>
-            <mc:Fallback>
+            <mc:Fallback xmlns="">
               <p:sp>
                 <p:nvSpPr>
                   <p:cNvPr id="171" name="TextBox 170">
@@ -11399,8 +11400,8 @@
               <a:chExt cx="1499411" cy="2526776"/>
             </a:xfrm>
           </p:grpSpPr>
-          <mc:AlternateContent xmlns:mc="http://schemas.openxmlformats.org/markup-compatibility/2006">
-            <mc:Choice xmlns:a14="http://schemas.microsoft.com/office/drawing/2010/main" Requires="a14">
+          <mc:AlternateContent xmlns:mc="http://schemas.openxmlformats.org/markup-compatibility/2006" xmlns:a14="http://schemas.microsoft.com/office/drawing/2010/main">
+            <mc:Choice Requires="a14">
               <p:sp>
                 <p:nvSpPr>
                   <p:cNvPr id="165" name="TextBox 164">
@@ -11450,7 +11451,7 @@
                 </p:txBody>
               </p:sp>
             </mc:Choice>
-            <mc:Fallback>
+            <mc:Fallback xmlns="">
               <p:sp>
                 <p:nvSpPr>
                   <p:cNvPr id="165" name="TextBox 164">
@@ -11495,8 +11496,8 @@
               </p:sp>
             </mc:Fallback>
           </mc:AlternateContent>
-          <mc:AlternateContent xmlns:mc="http://schemas.openxmlformats.org/markup-compatibility/2006">
-            <mc:Choice xmlns:a14="http://schemas.microsoft.com/office/drawing/2010/main" Requires="a14">
+          <mc:AlternateContent xmlns:mc="http://schemas.openxmlformats.org/markup-compatibility/2006" xmlns:a14="http://schemas.microsoft.com/office/drawing/2010/main">
+            <mc:Choice Requires="a14">
               <p:sp>
                 <p:nvSpPr>
                   <p:cNvPr id="166" name="TextBox 165">
@@ -11558,7 +11559,7 @@
                 </p:txBody>
               </p:sp>
             </mc:Choice>
-            <mc:Fallback>
+            <mc:Fallback xmlns="">
               <p:sp>
                 <p:nvSpPr>
                   <p:cNvPr id="166" name="TextBox 165">
@@ -15144,8 +15145,8 @@
           </p:grpSp>
         </p:grpSp>
       </p:grpSp>
-      <mc:AlternateContent xmlns:mc="http://schemas.openxmlformats.org/markup-compatibility/2006">
-        <mc:Choice xmlns:a14="http://schemas.microsoft.com/office/drawing/2010/main" Requires="a14">
+      <mc:AlternateContent xmlns:mc="http://schemas.openxmlformats.org/markup-compatibility/2006" xmlns:a14="http://schemas.microsoft.com/office/drawing/2010/main">
+        <mc:Choice Requires="a14">
           <p:sp>
             <p:nvSpPr>
               <p:cNvPr id="173" name="Rectangle 172">
@@ -15262,7 +15263,7 @@
             </p:txBody>
           </p:sp>
         </mc:Choice>
-        <mc:Fallback>
+        <mc:Fallback xmlns="">
           <p:sp>
             <p:nvSpPr>
               <p:cNvPr id="173" name="Rectangle 172">
@@ -15307,8 +15308,8 @@
           </p:sp>
         </mc:Fallback>
       </mc:AlternateContent>
-      <mc:AlternateContent xmlns:mc="http://schemas.openxmlformats.org/markup-compatibility/2006">
-        <mc:Choice xmlns:a14="http://schemas.microsoft.com/office/drawing/2010/main" Requires="a14">
+      <mc:AlternateContent xmlns:mc="http://schemas.openxmlformats.org/markup-compatibility/2006" xmlns:a14="http://schemas.microsoft.com/office/drawing/2010/main">
+        <mc:Choice Requires="a14">
           <p:sp>
             <p:nvSpPr>
               <p:cNvPr id="174" name="TextBox 173">
@@ -15426,7 +15427,7 @@
             </p:txBody>
           </p:sp>
         </mc:Choice>
-        <mc:Fallback>
+        <mc:Fallback xmlns="">
           <p:sp>
             <p:nvSpPr>
               <p:cNvPr id="174" name="TextBox 173">
@@ -15646,6 +15647,3421 @@
 </p:sld>
 </file>
 
+<file path=ppt/slides/slide5.xml><?xml version="1.0" encoding="utf-8"?>
+<p:sld xmlns:a="http://schemas.openxmlformats.org/drawingml/2006/main" xmlns:r="http://schemas.openxmlformats.org/officeDocument/2006/relationships" xmlns:p="http://schemas.openxmlformats.org/presentationml/2006/main">
+  <p:cSld>
+    <p:spTree>
+      <p:nvGrpSpPr>
+        <p:cNvPr id="1" name=""/>
+        <p:cNvGrpSpPr/>
+        <p:nvPr/>
+      </p:nvGrpSpPr>
+      <p:grpSpPr>
+        <a:xfrm>
+          <a:off x="0" y="0"/>
+          <a:ext cx="0" cy="0"/>
+          <a:chOff x="0" y="0"/>
+          <a:chExt cx="0" cy="0"/>
+        </a:xfrm>
+      </p:grpSpPr>
+      <p:sp>
+        <p:nvSpPr>
+          <p:cNvPr id="3" name="TextBox 2">
+            <a:extLst>
+              <a:ext uri="{FF2B5EF4-FFF2-40B4-BE49-F238E27FC236}">
+                <a16:creationId xmlns:a16="http://schemas.microsoft.com/office/drawing/2014/main" id="{290DF8FF-9D6E-4BAA-0710-9CA27E50895A}"/>
+              </a:ext>
+            </a:extLst>
+          </p:cNvPr>
+          <p:cNvSpPr txBox="1"/>
+          <p:nvPr/>
+        </p:nvSpPr>
+        <p:spPr>
+          <a:xfrm>
+            <a:off x="183964" y="238305"/>
+            <a:ext cx="11824071" cy="1107996"/>
+          </a:xfrm>
+          <a:prstGeom prst="rect">
+            <a:avLst/>
+          </a:prstGeom>
+          <a:noFill/>
+        </p:spPr>
+        <p:txBody>
+          <a:bodyPr wrap="none" rtlCol="0">
+            <a:spAutoFit/>
+          </a:bodyPr>
+          <a:lstStyle/>
+          <a:p>
+            <a:r>
+              <a:rPr lang="en-US" sz="6600" dirty="0">
+                <a:latin typeface="Alice" panose="00000500000000000000" pitchFamily="2" charset="0"/>
+              </a:rPr>
+              <a:t>A formal system for all physics</a:t>
+            </a:r>
+          </a:p>
+        </p:txBody>
+      </p:sp>
+      <p:sp>
+        <p:nvSpPr>
+          <p:cNvPr id="7" name="TextBox 6">
+            <a:extLst>
+              <a:ext uri="{FF2B5EF4-FFF2-40B4-BE49-F238E27FC236}">
+                <a16:creationId xmlns:a16="http://schemas.microsoft.com/office/drawing/2014/main" id="{8DD9A80C-9DA9-16F7-4DE2-8922416835E4}"/>
+              </a:ext>
+            </a:extLst>
+          </p:cNvPr>
+          <p:cNvSpPr txBox="1"/>
+          <p:nvPr/>
+        </p:nvSpPr>
+        <p:spPr>
+          <a:xfrm>
+            <a:off x="4006245" y="4983152"/>
+            <a:ext cx="7603363" cy="1569660"/>
+          </a:xfrm>
+          <a:prstGeom prst="rect">
+            <a:avLst/>
+          </a:prstGeom>
+          <a:noFill/>
+        </p:spPr>
+        <p:txBody>
+          <a:bodyPr wrap="none" rtlCol="0">
+            <a:spAutoFit/>
+          </a:bodyPr>
+          <a:lstStyle/>
+          <a:p>
+            <a:pPr algn="r"/>
+            <a:r>
+              <a:rPr lang="en-US" sz="9600" dirty="0">
+                <a:solidFill>
+                  <a:srgbClr val="C00000"/>
+                </a:solidFill>
+                <a:latin typeface="Alice" panose="00000500000000000000" pitchFamily="2" charset="0"/>
+              </a:rPr>
+              <a:t>Is it possible?</a:t>
+            </a:r>
+          </a:p>
+        </p:txBody>
+      </p:sp>
+      <p:cxnSp>
+        <p:nvCxnSpPr>
+          <p:cNvPr id="6" name="Straight Connector 5">
+            <a:extLst>
+              <a:ext uri="{FF2B5EF4-FFF2-40B4-BE49-F238E27FC236}">
+                <a16:creationId xmlns:a16="http://schemas.microsoft.com/office/drawing/2014/main" id="{AE00EFA7-49C6-EDEB-0591-9B34C9EF705A}"/>
+              </a:ext>
+            </a:extLst>
+          </p:cNvPr>
+          <p:cNvCxnSpPr>
+            <a:cxnSpLocks/>
+          </p:cNvCxnSpPr>
+          <p:nvPr/>
+        </p:nvCxnSpPr>
+        <p:spPr>
+          <a:xfrm>
+            <a:off x="6440665" y="1677685"/>
+            <a:ext cx="0" cy="3195642"/>
+          </a:xfrm>
+          <a:prstGeom prst="line">
+            <a:avLst/>
+          </a:prstGeom>
+          <a:ln w="28575">
+            <a:solidFill>
+              <a:schemeClr val="tx1"/>
+            </a:solidFill>
+            <a:prstDash val="sysDash"/>
+          </a:ln>
+        </p:spPr>
+        <p:style>
+          <a:lnRef idx="1">
+            <a:schemeClr val="accent1"/>
+          </a:lnRef>
+          <a:fillRef idx="0">
+            <a:schemeClr val="accent1"/>
+          </a:fillRef>
+          <a:effectRef idx="0">
+            <a:schemeClr val="accent1"/>
+          </a:effectRef>
+          <a:fontRef idx="minor">
+            <a:schemeClr val="tx1"/>
+          </a:fontRef>
+        </p:style>
+      </p:cxnSp>
+      <p:grpSp>
+        <p:nvGrpSpPr>
+          <p:cNvPr id="198" name="Group 197">
+            <a:extLst>
+              <a:ext uri="{FF2B5EF4-FFF2-40B4-BE49-F238E27FC236}">
+                <a16:creationId xmlns:a16="http://schemas.microsoft.com/office/drawing/2014/main" id="{5149939D-7748-C3C9-A9CD-9DBDCCC91EEA}"/>
+              </a:ext>
+            </a:extLst>
+          </p:cNvPr>
+          <p:cNvGrpSpPr/>
+          <p:nvPr/>
+        </p:nvGrpSpPr>
+        <p:grpSpPr>
+          <a:xfrm>
+            <a:off x="1594951" y="2675204"/>
+            <a:ext cx="1808508" cy="1042036"/>
+            <a:chOff x="715336" y="2368006"/>
+            <a:chExt cx="1808508" cy="1042036"/>
+          </a:xfrm>
+        </p:grpSpPr>
+        <p:sp>
+          <p:nvSpPr>
+            <p:cNvPr id="4" name="TextBox 3">
+              <a:extLst>
+                <a:ext uri="{FF2B5EF4-FFF2-40B4-BE49-F238E27FC236}">
+                  <a16:creationId xmlns:a16="http://schemas.microsoft.com/office/drawing/2014/main" id="{38078B33-6436-CA4A-6556-8FFB57ABDE4D}"/>
+                </a:ext>
+              </a:extLst>
+            </p:cNvPr>
+            <p:cNvSpPr txBox="1"/>
+            <p:nvPr/>
+          </p:nvSpPr>
+          <p:spPr>
+            <a:xfrm>
+              <a:off x="715336" y="2368006"/>
+              <a:ext cx="1808508" cy="584775"/>
+            </a:xfrm>
+            <a:prstGeom prst="rect">
+              <a:avLst/>
+            </a:prstGeom>
+            <a:noFill/>
+          </p:spPr>
+          <p:txBody>
+            <a:bodyPr wrap="none" rtlCol="0">
+              <a:spAutoFit/>
+            </a:bodyPr>
+            <a:lstStyle/>
+            <a:p>
+              <a:pPr algn="ctr"/>
+              <a:r>
+                <a:rPr lang="en-US" sz="3200" dirty="0"/>
+                <a:t>Informal</a:t>
+              </a:r>
+            </a:p>
+          </p:txBody>
+        </p:sp>
+        <p:sp>
+          <p:nvSpPr>
+            <p:cNvPr id="19" name="TextBox 18">
+              <a:extLst>
+                <a:ext uri="{FF2B5EF4-FFF2-40B4-BE49-F238E27FC236}">
+                  <a16:creationId xmlns:a16="http://schemas.microsoft.com/office/drawing/2014/main" id="{8A8E29B7-52C6-17D0-BFA2-42314BBF7BE8}"/>
+                </a:ext>
+              </a:extLst>
+            </p:cNvPr>
+            <p:cNvSpPr txBox="1"/>
+            <p:nvPr/>
+          </p:nvSpPr>
+          <p:spPr>
+            <a:xfrm>
+              <a:off x="1004521" y="2948377"/>
+              <a:ext cx="1225015" cy="461665"/>
+            </a:xfrm>
+            <a:prstGeom prst="rect">
+              <a:avLst/>
+            </a:prstGeom>
+            <a:noFill/>
+          </p:spPr>
+          <p:txBody>
+            <a:bodyPr wrap="none" rtlCol="0">
+              <a:spAutoFit/>
+            </a:bodyPr>
+            <a:lstStyle/>
+            <a:p>
+              <a:pPr algn="ctr"/>
+              <a:r>
+                <a:rPr lang="en-US" sz="2400" dirty="0"/>
+                <a:t>physics</a:t>
+              </a:r>
+            </a:p>
+          </p:txBody>
+        </p:sp>
+      </p:grpSp>
+      <p:grpSp>
+        <p:nvGrpSpPr>
+          <p:cNvPr id="197" name="Group 196">
+            <a:extLst>
+              <a:ext uri="{FF2B5EF4-FFF2-40B4-BE49-F238E27FC236}">
+                <a16:creationId xmlns:a16="http://schemas.microsoft.com/office/drawing/2014/main" id="{3F01BE00-13C7-C466-DD2F-8DBB8B9427A4}"/>
+              </a:ext>
+            </a:extLst>
+          </p:cNvPr>
+          <p:cNvGrpSpPr/>
+          <p:nvPr/>
+        </p:nvGrpSpPr>
+        <p:grpSpPr>
+          <a:xfrm>
+            <a:off x="8753913" y="2622440"/>
+            <a:ext cx="1487908" cy="1046440"/>
+            <a:chOff x="8549895" y="2312483"/>
+            <a:chExt cx="1487908" cy="1046440"/>
+          </a:xfrm>
+        </p:grpSpPr>
+        <p:sp>
+          <p:nvSpPr>
+            <p:cNvPr id="5" name="TextBox 4">
+              <a:extLst>
+                <a:ext uri="{FF2B5EF4-FFF2-40B4-BE49-F238E27FC236}">
+                  <a16:creationId xmlns:a16="http://schemas.microsoft.com/office/drawing/2014/main" id="{E484C0C7-DA35-888E-AAB3-BFEB1E7F3632}"/>
+                </a:ext>
+              </a:extLst>
+            </p:cNvPr>
+            <p:cNvSpPr txBox="1"/>
+            <p:nvPr/>
+          </p:nvSpPr>
+          <p:spPr>
+            <a:xfrm>
+              <a:off x="8549895" y="2312483"/>
+              <a:ext cx="1487908" cy="584775"/>
+            </a:xfrm>
+            <a:prstGeom prst="rect">
+              <a:avLst/>
+            </a:prstGeom>
+            <a:noFill/>
+          </p:spPr>
+          <p:txBody>
+            <a:bodyPr wrap="none" rtlCol="0">
+              <a:spAutoFit/>
+            </a:bodyPr>
+            <a:lstStyle/>
+            <a:p>
+              <a:pPr algn="ctr"/>
+              <a:r>
+                <a:rPr lang="en-US" sz="3200" dirty="0"/>
+                <a:t>Formal</a:t>
+              </a:r>
+            </a:p>
+          </p:txBody>
+        </p:sp>
+        <p:sp>
+          <p:nvSpPr>
+            <p:cNvPr id="20" name="TextBox 19">
+              <a:extLst>
+                <a:ext uri="{FF2B5EF4-FFF2-40B4-BE49-F238E27FC236}">
+                  <a16:creationId xmlns:a16="http://schemas.microsoft.com/office/drawing/2014/main" id="{395E3FB3-460A-32B3-10E2-EDA3E40C72F6}"/>
+                </a:ext>
+              </a:extLst>
+            </p:cNvPr>
+            <p:cNvSpPr txBox="1"/>
+            <p:nvPr/>
+          </p:nvSpPr>
+          <p:spPr>
+            <a:xfrm>
+              <a:off x="8837635" y="2897258"/>
+              <a:ext cx="912429" cy="461665"/>
+            </a:xfrm>
+            <a:prstGeom prst="rect">
+              <a:avLst/>
+            </a:prstGeom>
+            <a:noFill/>
+          </p:spPr>
+          <p:txBody>
+            <a:bodyPr wrap="none" rtlCol="0">
+              <a:spAutoFit/>
+            </a:bodyPr>
+            <a:lstStyle/>
+            <a:p>
+              <a:pPr algn="ctr"/>
+              <a:r>
+                <a:rPr lang="en-US" sz="2400" dirty="0"/>
+                <a:t>math</a:t>
+              </a:r>
+            </a:p>
+          </p:txBody>
+        </p:sp>
+      </p:grpSp>
+      <p:grpSp>
+        <p:nvGrpSpPr>
+          <p:cNvPr id="199" name="Group 198">
+            <a:extLst>
+              <a:ext uri="{FF2B5EF4-FFF2-40B4-BE49-F238E27FC236}">
+                <a16:creationId xmlns:a16="http://schemas.microsoft.com/office/drawing/2014/main" id="{1ED636E1-C770-94E9-CD8D-2D2ACFBD18CD}"/>
+              </a:ext>
+            </a:extLst>
+          </p:cNvPr>
+          <p:cNvGrpSpPr/>
+          <p:nvPr/>
+        </p:nvGrpSpPr>
+        <p:grpSpPr>
+          <a:xfrm>
+            <a:off x="3976667" y="1984672"/>
+            <a:ext cx="4238665" cy="2888655"/>
+            <a:chOff x="3299818" y="2668707"/>
+            <a:chExt cx="3141467" cy="2140913"/>
+          </a:xfrm>
+        </p:grpSpPr>
+        <p:sp>
+          <p:nvSpPr>
+            <p:cNvPr id="21" name="Freeform: Shape 20">
+              <a:extLst>
+                <a:ext uri="{FF2B5EF4-FFF2-40B4-BE49-F238E27FC236}">
+                  <a16:creationId xmlns:a16="http://schemas.microsoft.com/office/drawing/2014/main" id="{0B325EF7-2FC9-4DB7-EF79-9FE7A5EDBCE6}"/>
+                </a:ext>
+              </a:extLst>
+            </p:cNvPr>
+            <p:cNvSpPr/>
+            <p:nvPr/>
+          </p:nvSpPr>
+          <p:spPr>
+            <a:xfrm>
+              <a:off x="3984765" y="2668707"/>
+              <a:ext cx="387740" cy="399282"/>
+            </a:xfrm>
+            <a:custGeom>
+              <a:avLst/>
+              <a:gdLst>
+                <a:gd name="connsiteX0" fmla="*/ 339365 w 576721"/>
+                <a:gd name="connsiteY0" fmla="*/ 0 h 593888"/>
+                <a:gd name="connsiteX1" fmla="*/ 339365 w 576721"/>
+                <a:gd name="connsiteY1" fmla="*/ 0 h 593888"/>
+                <a:gd name="connsiteX2" fmla="*/ 226244 w 576721"/>
+                <a:gd name="connsiteY2" fmla="*/ 9427 h 593888"/>
+                <a:gd name="connsiteX3" fmla="*/ 169683 w 576721"/>
+                <a:gd name="connsiteY3" fmla="*/ 28280 h 593888"/>
+                <a:gd name="connsiteX4" fmla="*/ 131975 w 576721"/>
+                <a:gd name="connsiteY4" fmla="*/ 37707 h 593888"/>
+                <a:gd name="connsiteX5" fmla="*/ 94268 w 576721"/>
+                <a:gd name="connsiteY5" fmla="*/ 65987 h 593888"/>
+                <a:gd name="connsiteX6" fmla="*/ 37707 w 576721"/>
+                <a:gd name="connsiteY6" fmla="*/ 150829 h 593888"/>
+                <a:gd name="connsiteX7" fmla="*/ 18854 w 576721"/>
+                <a:gd name="connsiteY7" fmla="*/ 207389 h 593888"/>
+                <a:gd name="connsiteX8" fmla="*/ 9427 w 576721"/>
+                <a:gd name="connsiteY8" fmla="*/ 235670 h 593888"/>
+                <a:gd name="connsiteX9" fmla="*/ 0 w 576721"/>
+                <a:gd name="connsiteY9" fmla="*/ 263950 h 593888"/>
+                <a:gd name="connsiteX10" fmla="*/ 9427 w 576721"/>
+                <a:gd name="connsiteY10" fmla="*/ 461913 h 593888"/>
+                <a:gd name="connsiteX11" fmla="*/ 28281 w 576721"/>
+                <a:gd name="connsiteY11" fmla="*/ 490194 h 593888"/>
+                <a:gd name="connsiteX12" fmla="*/ 141402 w 576721"/>
+                <a:gd name="connsiteY12" fmla="*/ 565608 h 593888"/>
+                <a:gd name="connsiteX13" fmla="*/ 197963 w 576721"/>
+                <a:gd name="connsiteY13" fmla="*/ 593888 h 593888"/>
+                <a:gd name="connsiteX14" fmla="*/ 546755 w 576721"/>
+                <a:gd name="connsiteY14" fmla="*/ 584462 h 593888"/>
+                <a:gd name="connsiteX15" fmla="*/ 575035 w 576721"/>
+                <a:gd name="connsiteY15" fmla="*/ 565608 h 593888"/>
+                <a:gd name="connsiteX16" fmla="*/ 565608 w 576721"/>
+                <a:gd name="connsiteY16" fmla="*/ 405352 h 593888"/>
+                <a:gd name="connsiteX17" fmla="*/ 556182 w 576721"/>
+                <a:gd name="connsiteY17" fmla="*/ 377072 h 593888"/>
+                <a:gd name="connsiteX18" fmla="*/ 490194 w 576721"/>
+                <a:gd name="connsiteY18" fmla="*/ 348792 h 593888"/>
+                <a:gd name="connsiteX19" fmla="*/ 405353 w 576721"/>
+                <a:gd name="connsiteY19" fmla="*/ 339365 h 593888"/>
+                <a:gd name="connsiteX20" fmla="*/ 386499 w 576721"/>
+                <a:gd name="connsiteY20" fmla="*/ 311084 h 593888"/>
+                <a:gd name="connsiteX21" fmla="*/ 386499 w 576721"/>
+                <a:gd name="connsiteY21" fmla="*/ 216816 h 593888"/>
+                <a:gd name="connsiteX22" fmla="*/ 414780 w 576721"/>
+                <a:gd name="connsiteY22" fmla="*/ 197963 h 593888"/>
+                <a:gd name="connsiteX23" fmla="*/ 452487 w 576721"/>
+                <a:gd name="connsiteY23" fmla="*/ 150829 h 593888"/>
+                <a:gd name="connsiteX24" fmla="*/ 461914 w 576721"/>
+                <a:gd name="connsiteY24" fmla="*/ 113121 h 593888"/>
+                <a:gd name="connsiteX25" fmla="*/ 452487 w 576721"/>
+                <a:gd name="connsiteY25" fmla="*/ 47134 h 593888"/>
+                <a:gd name="connsiteX26" fmla="*/ 424206 w 576721"/>
+                <a:gd name="connsiteY26" fmla="*/ 28280 h 593888"/>
+                <a:gd name="connsiteX27" fmla="*/ 377072 w 576721"/>
+                <a:gd name="connsiteY27" fmla="*/ 18853 h 593888"/>
+                <a:gd name="connsiteX28" fmla="*/ 339365 w 576721"/>
+                <a:gd name="connsiteY28" fmla="*/ 0 h 593888"/>
+              </a:gdLst>
+              <a:ahLst/>
+              <a:cxnLst>
+                <a:cxn ang="0">
+                  <a:pos x="connsiteX0" y="connsiteY0"/>
+                </a:cxn>
+                <a:cxn ang="0">
+                  <a:pos x="connsiteX1" y="connsiteY1"/>
+                </a:cxn>
+                <a:cxn ang="0">
+                  <a:pos x="connsiteX2" y="connsiteY2"/>
+                </a:cxn>
+                <a:cxn ang="0">
+                  <a:pos x="connsiteX3" y="connsiteY3"/>
+                </a:cxn>
+                <a:cxn ang="0">
+                  <a:pos x="connsiteX4" y="connsiteY4"/>
+                </a:cxn>
+                <a:cxn ang="0">
+                  <a:pos x="connsiteX5" y="connsiteY5"/>
+                </a:cxn>
+                <a:cxn ang="0">
+                  <a:pos x="connsiteX6" y="connsiteY6"/>
+                </a:cxn>
+                <a:cxn ang="0">
+                  <a:pos x="connsiteX7" y="connsiteY7"/>
+                </a:cxn>
+                <a:cxn ang="0">
+                  <a:pos x="connsiteX8" y="connsiteY8"/>
+                </a:cxn>
+                <a:cxn ang="0">
+                  <a:pos x="connsiteX9" y="connsiteY9"/>
+                </a:cxn>
+                <a:cxn ang="0">
+                  <a:pos x="connsiteX10" y="connsiteY10"/>
+                </a:cxn>
+                <a:cxn ang="0">
+                  <a:pos x="connsiteX11" y="connsiteY11"/>
+                </a:cxn>
+                <a:cxn ang="0">
+                  <a:pos x="connsiteX12" y="connsiteY12"/>
+                </a:cxn>
+                <a:cxn ang="0">
+                  <a:pos x="connsiteX13" y="connsiteY13"/>
+                </a:cxn>
+                <a:cxn ang="0">
+                  <a:pos x="connsiteX14" y="connsiteY14"/>
+                </a:cxn>
+                <a:cxn ang="0">
+                  <a:pos x="connsiteX15" y="connsiteY15"/>
+                </a:cxn>
+                <a:cxn ang="0">
+                  <a:pos x="connsiteX16" y="connsiteY16"/>
+                </a:cxn>
+                <a:cxn ang="0">
+                  <a:pos x="connsiteX17" y="connsiteY17"/>
+                </a:cxn>
+                <a:cxn ang="0">
+                  <a:pos x="connsiteX18" y="connsiteY18"/>
+                </a:cxn>
+                <a:cxn ang="0">
+                  <a:pos x="connsiteX19" y="connsiteY19"/>
+                </a:cxn>
+                <a:cxn ang="0">
+                  <a:pos x="connsiteX20" y="connsiteY20"/>
+                </a:cxn>
+                <a:cxn ang="0">
+                  <a:pos x="connsiteX21" y="connsiteY21"/>
+                </a:cxn>
+                <a:cxn ang="0">
+                  <a:pos x="connsiteX22" y="connsiteY22"/>
+                </a:cxn>
+                <a:cxn ang="0">
+                  <a:pos x="connsiteX23" y="connsiteY23"/>
+                </a:cxn>
+                <a:cxn ang="0">
+                  <a:pos x="connsiteX24" y="connsiteY24"/>
+                </a:cxn>
+                <a:cxn ang="0">
+                  <a:pos x="connsiteX25" y="connsiteY25"/>
+                </a:cxn>
+                <a:cxn ang="0">
+                  <a:pos x="connsiteX26" y="connsiteY26"/>
+                </a:cxn>
+                <a:cxn ang="0">
+                  <a:pos x="connsiteX27" y="connsiteY27"/>
+                </a:cxn>
+                <a:cxn ang="0">
+                  <a:pos x="connsiteX28" y="connsiteY28"/>
+                </a:cxn>
+              </a:cxnLst>
+              <a:rect l="l" t="t" r="r" b="b"/>
+              <a:pathLst>
+                <a:path w="576721" h="593888">
+                  <a:moveTo>
+                    <a:pt x="339365" y="0"/>
+                  </a:moveTo>
+                  <a:lnTo>
+                    <a:pt x="339365" y="0"/>
+                  </a:lnTo>
+                  <a:cubicBezTo>
+                    <a:pt x="301658" y="3142"/>
+                    <a:pt x="263567" y="3207"/>
+                    <a:pt x="226244" y="9427"/>
+                  </a:cubicBezTo>
+                  <a:cubicBezTo>
+                    <a:pt x="206641" y="12694"/>
+                    <a:pt x="188963" y="23460"/>
+                    <a:pt x="169683" y="28280"/>
+                  </a:cubicBezTo>
+                  <a:lnTo>
+                    <a:pt x="131975" y="37707"/>
+                  </a:lnTo>
+                  <a:cubicBezTo>
+                    <a:pt x="119406" y="47134"/>
+                    <a:pt x="105377" y="54877"/>
+                    <a:pt x="94268" y="65987"/>
+                  </a:cubicBezTo>
+                  <a:cubicBezTo>
+                    <a:pt x="79765" y="80490"/>
+                    <a:pt x="45185" y="134378"/>
+                    <a:pt x="37707" y="150829"/>
+                  </a:cubicBezTo>
+                  <a:cubicBezTo>
+                    <a:pt x="29483" y="168921"/>
+                    <a:pt x="25138" y="188536"/>
+                    <a:pt x="18854" y="207389"/>
+                  </a:cubicBezTo>
+                  <a:lnTo>
+                    <a:pt x="9427" y="235670"/>
+                  </a:lnTo>
+                  <a:lnTo>
+                    <a:pt x="0" y="263950"/>
+                  </a:lnTo>
+                  <a:cubicBezTo>
+                    <a:pt x="3142" y="329938"/>
+                    <a:pt x="1233" y="396361"/>
+                    <a:pt x="9427" y="461913"/>
+                  </a:cubicBezTo>
+                  <a:cubicBezTo>
+                    <a:pt x="10832" y="473155"/>
+                    <a:pt x="19860" y="482615"/>
+                    <a:pt x="28281" y="490194"/>
+                  </a:cubicBezTo>
+                  <a:cubicBezTo>
+                    <a:pt x="107364" y="561369"/>
+                    <a:pt x="78977" y="529936"/>
+                    <a:pt x="141402" y="565608"/>
+                  </a:cubicBezTo>
+                  <a:cubicBezTo>
+                    <a:pt x="192567" y="594845"/>
+                    <a:pt x="146116" y="576607"/>
+                    <a:pt x="197963" y="593888"/>
+                  </a:cubicBezTo>
+                  <a:cubicBezTo>
+                    <a:pt x="314227" y="590746"/>
+                    <a:pt x="430774" y="593160"/>
+                    <a:pt x="546755" y="584462"/>
+                  </a:cubicBezTo>
+                  <a:cubicBezTo>
+                    <a:pt x="558053" y="583615"/>
+                    <a:pt x="573849" y="576875"/>
+                    <a:pt x="575035" y="565608"/>
+                  </a:cubicBezTo>
+                  <a:cubicBezTo>
+                    <a:pt x="580637" y="512391"/>
+                    <a:pt x="570932" y="458597"/>
+                    <a:pt x="565608" y="405352"/>
+                  </a:cubicBezTo>
+                  <a:cubicBezTo>
+                    <a:pt x="564619" y="395465"/>
+                    <a:pt x="562389" y="384831"/>
+                    <a:pt x="556182" y="377072"/>
+                  </a:cubicBezTo>
+                  <a:cubicBezTo>
+                    <a:pt x="541643" y="358898"/>
+                    <a:pt x="510852" y="351970"/>
+                    <a:pt x="490194" y="348792"/>
+                  </a:cubicBezTo>
+                  <a:cubicBezTo>
+                    <a:pt x="462070" y="344465"/>
+                    <a:pt x="433633" y="342507"/>
+                    <a:pt x="405353" y="339365"/>
+                  </a:cubicBezTo>
+                  <a:cubicBezTo>
+                    <a:pt x="399068" y="329938"/>
+                    <a:pt x="391566" y="321218"/>
+                    <a:pt x="386499" y="311084"/>
+                  </a:cubicBezTo>
+                  <a:cubicBezTo>
+                    <a:pt x="371588" y="281263"/>
+                    <a:pt x="372216" y="248951"/>
+                    <a:pt x="386499" y="216816"/>
+                  </a:cubicBezTo>
+                  <a:cubicBezTo>
+                    <a:pt x="391101" y="206463"/>
+                    <a:pt x="405353" y="204247"/>
+                    <a:pt x="414780" y="197963"/>
+                  </a:cubicBezTo>
+                  <a:cubicBezTo>
+                    <a:pt x="445593" y="105513"/>
+                    <a:pt x="395637" y="236102"/>
+                    <a:pt x="452487" y="150829"/>
+                  </a:cubicBezTo>
+                  <a:cubicBezTo>
+                    <a:pt x="459674" y="140049"/>
+                    <a:pt x="458772" y="125690"/>
+                    <a:pt x="461914" y="113121"/>
+                  </a:cubicBezTo>
+                  <a:cubicBezTo>
+                    <a:pt x="458772" y="91125"/>
+                    <a:pt x="461511" y="67438"/>
+                    <a:pt x="452487" y="47134"/>
+                  </a:cubicBezTo>
+                  <a:cubicBezTo>
+                    <a:pt x="447885" y="36781"/>
+                    <a:pt x="434814" y="32258"/>
+                    <a:pt x="424206" y="28280"/>
+                  </a:cubicBezTo>
+                  <a:cubicBezTo>
+                    <a:pt x="409204" y="22654"/>
+                    <a:pt x="392713" y="22329"/>
+                    <a:pt x="377072" y="18853"/>
+                  </a:cubicBezTo>
+                  <a:cubicBezTo>
+                    <a:pt x="317507" y="5617"/>
+                    <a:pt x="345649" y="3142"/>
+                    <a:pt x="339365" y="0"/>
+                  </a:cubicBezTo>
+                  <a:close/>
+                </a:path>
+              </a:pathLst>
+            </a:custGeom>
+            <a:gradFill flip="none" rotWithShape="1">
+              <a:gsLst>
+                <a:gs pos="56000">
+                  <a:srgbClr val="3C1A56"/>
+                </a:gs>
+                <a:gs pos="100000">
+                  <a:schemeClr val="bg1"/>
+                </a:gs>
+                <a:gs pos="12000">
+                  <a:srgbClr val="7030A0"/>
+                </a:gs>
+              </a:gsLst>
+              <a:path path="circle">
+                <a:fillToRect l="50000" t="50000" r="50000" b="50000"/>
+              </a:path>
+              <a:tileRect/>
+            </a:gradFill>
+            <a:ln>
+              <a:noFill/>
+            </a:ln>
+          </p:spPr>
+          <p:style>
+            <a:lnRef idx="2">
+              <a:schemeClr val="accent1">
+                <a:shade val="50000"/>
+              </a:schemeClr>
+            </a:lnRef>
+            <a:fillRef idx="1">
+              <a:schemeClr val="accent1"/>
+            </a:fillRef>
+            <a:effectRef idx="0">
+              <a:schemeClr val="accent1"/>
+            </a:effectRef>
+            <a:fontRef idx="minor">
+              <a:schemeClr val="lt1"/>
+            </a:fontRef>
+          </p:style>
+          <p:txBody>
+            <a:bodyPr rtlCol="0" anchor="ctr"/>
+            <a:lstStyle/>
+            <a:p>
+              <a:pPr algn="ctr"/>
+              <a:endParaRPr lang="en-US"/>
+            </a:p>
+          </p:txBody>
+        </p:sp>
+        <p:sp>
+          <p:nvSpPr>
+            <p:cNvPr id="22" name="Freeform: Shape 21">
+              <a:extLst>
+                <a:ext uri="{FF2B5EF4-FFF2-40B4-BE49-F238E27FC236}">
+                  <a16:creationId xmlns:a16="http://schemas.microsoft.com/office/drawing/2014/main" id="{86E046BB-DE45-D857-6F23-E9869FE9745E}"/>
+                </a:ext>
+              </a:extLst>
+            </p:cNvPr>
+            <p:cNvSpPr/>
+            <p:nvPr/>
+          </p:nvSpPr>
+          <p:spPr>
+            <a:xfrm>
+              <a:off x="3299818" y="3099159"/>
+              <a:ext cx="531881" cy="496044"/>
+            </a:xfrm>
+            <a:custGeom>
+              <a:avLst/>
+              <a:gdLst>
+                <a:gd name="connsiteX0" fmla="*/ 641356 w 1061407"/>
+                <a:gd name="connsiteY0" fmla="*/ 330740 h 989892"/>
+                <a:gd name="connsiteX1" fmla="*/ 641356 w 1061407"/>
+                <a:gd name="connsiteY1" fmla="*/ 330740 h 989892"/>
+                <a:gd name="connsiteX2" fmla="*/ 631629 w 1061407"/>
+                <a:gd name="connsiteY2" fmla="*/ 243191 h 989892"/>
+                <a:gd name="connsiteX3" fmla="*/ 621901 w 1061407"/>
+                <a:gd name="connsiteY3" fmla="*/ 214008 h 989892"/>
+                <a:gd name="connsiteX4" fmla="*/ 612173 w 1061407"/>
+                <a:gd name="connsiteY4" fmla="*/ 175098 h 989892"/>
+                <a:gd name="connsiteX5" fmla="*/ 602446 w 1061407"/>
+                <a:gd name="connsiteY5" fmla="*/ 126460 h 989892"/>
+                <a:gd name="connsiteX6" fmla="*/ 582990 w 1061407"/>
+                <a:gd name="connsiteY6" fmla="*/ 107004 h 989892"/>
+                <a:gd name="connsiteX7" fmla="*/ 553807 w 1061407"/>
+                <a:gd name="connsiteY7" fmla="*/ 68094 h 989892"/>
+                <a:gd name="connsiteX8" fmla="*/ 475986 w 1061407"/>
+                <a:gd name="connsiteY8" fmla="*/ 0 h 989892"/>
+                <a:gd name="connsiteX9" fmla="*/ 446803 w 1061407"/>
+                <a:gd name="connsiteY9" fmla="*/ 9728 h 989892"/>
+                <a:gd name="connsiteX10" fmla="*/ 437076 w 1061407"/>
+                <a:gd name="connsiteY10" fmla="*/ 38911 h 989892"/>
+                <a:gd name="connsiteX11" fmla="*/ 417620 w 1061407"/>
+                <a:gd name="connsiteY11" fmla="*/ 58366 h 989892"/>
+                <a:gd name="connsiteX12" fmla="*/ 388437 w 1061407"/>
+                <a:gd name="connsiteY12" fmla="*/ 126460 h 989892"/>
+                <a:gd name="connsiteX13" fmla="*/ 368982 w 1061407"/>
+                <a:gd name="connsiteY13" fmla="*/ 184825 h 989892"/>
+                <a:gd name="connsiteX14" fmla="*/ 349527 w 1061407"/>
+                <a:gd name="connsiteY14" fmla="*/ 243191 h 989892"/>
+                <a:gd name="connsiteX15" fmla="*/ 310616 w 1061407"/>
+                <a:gd name="connsiteY15" fmla="*/ 291830 h 989892"/>
+                <a:gd name="connsiteX16" fmla="*/ 38242 w 1061407"/>
+                <a:gd name="connsiteY16" fmla="*/ 301557 h 989892"/>
+                <a:gd name="connsiteX17" fmla="*/ 28514 w 1061407"/>
+                <a:gd name="connsiteY17" fmla="*/ 515566 h 989892"/>
+                <a:gd name="connsiteX18" fmla="*/ 47969 w 1061407"/>
+                <a:gd name="connsiteY18" fmla="*/ 544749 h 989892"/>
+                <a:gd name="connsiteX19" fmla="*/ 106335 w 1061407"/>
+                <a:gd name="connsiteY19" fmla="*/ 564204 h 989892"/>
+                <a:gd name="connsiteX20" fmla="*/ 135518 w 1061407"/>
+                <a:gd name="connsiteY20" fmla="*/ 573932 h 989892"/>
+                <a:gd name="connsiteX21" fmla="*/ 164701 w 1061407"/>
+                <a:gd name="connsiteY21" fmla="*/ 593387 h 989892"/>
+                <a:gd name="connsiteX22" fmla="*/ 213339 w 1061407"/>
+                <a:gd name="connsiteY22" fmla="*/ 603115 h 989892"/>
+                <a:gd name="connsiteX23" fmla="*/ 271705 w 1061407"/>
+                <a:gd name="connsiteY23" fmla="*/ 622570 h 989892"/>
+                <a:gd name="connsiteX24" fmla="*/ 291161 w 1061407"/>
+                <a:gd name="connsiteY24" fmla="*/ 642025 h 989892"/>
+                <a:gd name="connsiteX25" fmla="*/ 281433 w 1061407"/>
+                <a:gd name="connsiteY25" fmla="*/ 680936 h 989892"/>
+                <a:gd name="connsiteX26" fmla="*/ 242522 w 1061407"/>
+                <a:gd name="connsiteY26" fmla="*/ 729574 h 989892"/>
+                <a:gd name="connsiteX27" fmla="*/ 223067 w 1061407"/>
+                <a:gd name="connsiteY27" fmla="*/ 768485 h 989892"/>
+                <a:gd name="connsiteX28" fmla="*/ 184156 w 1061407"/>
+                <a:gd name="connsiteY28" fmla="*/ 836579 h 989892"/>
+                <a:gd name="connsiteX29" fmla="*/ 174429 w 1061407"/>
+                <a:gd name="connsiteY29" fmla="*/ 865762 h 989892"/>
+                <a:gd name="connsiteX30" fmla="*/ 184156 w 1061407"/>
+                <a:gd name="connsiteY30" fmla="*/ 982494 h 989892"/>
+                <a:gd name="connsiteX31" fmla="*/ 242522 w 1061407"/>
+                <a:gd name="connsiteY31" fmla="*/ 972766 h 989892"/>
+                <a:gd name="connsiteX32" fmla="*/ 281433 w 1061407"/>
+                <a:gd name="connsiteY32" fmla="*/ 914400 h 989892"/>
+                <a:gd name="connsiteX33" fmla="*/ 330071 w 1061407"/>
+                <a:gd name="connsiteY33" fmla="*/ 875489 h 989892"/>
+                <a:gd name="connsiteX34" fmla="*/ 359254 w 1061407"/>
+                <a:gd name="connsiteY34" fmla="*/ 856034 h 989892"/>
+                <a:gd name="connsiteX35" fmla="*/ 398165 w 1061407"/>
+                <a:gd name="connsiteY35" fmla="*/ 817123 h 989892"/>
+                <a:gd name="connsiteX36" fmla="*/ 407893 w 1061407"/>
+                <a:gd name="connsiteY36" fmla="*/ 787940 h 989892"/>
+                <a:gd name="connsiteX37" fmla="*/ 563535 w 1061407"/>
+                <a:gd name="connsiteY37" fmla="*/ 807396 h 989892"/>
+                <a:gd name="connsiteX38" fmla="*/ 592718 w 1061407"/>
+                <a:gd name="connsiteY38" fmla="*/ 826851 h 989892"/>
+                <a:gd name="connsiteX39" fmla="*/ 651084 w 1061407"/>
+                <a:gd name="connsiteY39" fmla="*/ 846306 h 989892"/>
+                <a:gd name="connsiteX40" fmla="*/ 680267 w 1061407"/>
+                <a:gd name="connsiteY40" fmla="*/ 856034 h 989892"/>
+                <a:gd name="connsiteX41" fmla="*/ 709450 w 1061407"/>
+                <a:gd name="connsiteY41" fmla="*/ 865762 h 989892"/>
+                <a:gd name="connsiteX42" fmla="*/ 777544 w 1061407"/>
+                <a:gd name="connsiteY42" fmla="*/ 894945 h 989892"/>
+                <a:gd name="connsiteX43" fmla="*/ 904003 w 1061407"/>
+                <a:gd name="connsiteY43" fmla="*/ 885217 h 989892"/>
+                <a:gd name="connsiteX44" fmla="*/ 952642 w 1061407"/>
+                <a:gd name="connsiteY44" fmla="*/ 875489 h 989892"/>
+                <a:gd name="connsiteX45" fmla="*/ 972097 w 1061407"/>
+                <a:gd name="connsiteY45" fmla="*/ 846306 h 989892"/>
+                <a:gd name="connsiteX46" fmla="*/ 962369 w 1061407"/>
+                <a:gd name="connsiteY46" fmla="*/ 817123 h 989892"/>
+                <a:gd name="connsiteX47" fmla="*/ 904003 w 1061407"/>
+                <a:gd name="connsiteY47" fmla="*/ 778213 h 989892"/>
+                <a:gd name="connsiteX48" fmla="*/ 816454 w 1061407"/>
+                <a:gd name="connsiteY48" fmla="*/ 739302 h 989892"/>
+                <a:gd name="connsiteX49" fmla="*/ 787271 w 1061407"/>
+                <a:gd name="connsiteY49" fmla="*/ 729574 h 989892"/>
+                <a:gd name="connsiteX50" fmla="*/ 758088 w 1061407"/>
+                <a:gd name="connsiteY50" fmla="*/ 719847 h 989892"/>
+                <a:gd name="connsiteX51" fmla="*/ 719178 w 1061407"/>
+                <a:gd name="connsiteY51" fmla="*/ 671208 h 989892"/>
+                <a:gd name="connsiteX52" fmla="*/ 767816 w 1061407"/>
+                <a:gd name="connsiteY52" fmla="*/ 642025 h 989892"/>
+                <a:gd name="connsiteX53" fmla="*/ 855365 w 1061407"/>
+                <a:gd name="connsiteY53" fmla="*/ 612842 h 989892"/>
+                <a:gd name="connsiteX54" fmla="*/ 972097 w 1061407"/>
+                <a:gd name="connsiteY54" fmla="*/ 593387 h 989892"/>
+                <a:gd name="connsiteX55" fmla="*/ 1030463 w 1061407"/>
+                <a:gd name="connsiteY55" fmla="*/ 573932 h 989892"/>
+                <a:gd name="connsiteX56" fmla="*/ 1049918 w 1061407"/>
+                <a:gd name="connsiteY56" fmla="*/ 544749 h 989892"/>
+                <a:gd name="connsiteX57" fmla="*/ 1049918 w 1061407"/>
+                <a:gd name="connsiteY57" fmla="*/ 447472 h 989892"/>
+                <a:gd name="connsiteX58" fmla="*/ 1020735 w 1061407"/>
+                <a:gd name="connsiteY58" fmla="*/ 437745 h 989892"/>
+                <a:gd name="connsiteX59" fmla="*/ 1001280 w 1061407"/>
+                <a:gd name="connsiteY59" fmla="*/ 418289 h 989892"/>
+                <a:gd name="connsiteX60" fmla="*/ 933186 w 1061407"/>
+                <a:gd name="connsiteY60" fmla="*/ 398834 h 989892"/>
+                <a:gd name="connsiteX61" fmla="*/ 651084 w 1061407"/>
+                <a:gd name="connsiteY61" fmla="*/ 389106 h 989892"/>
+                <a:gd name="connsiteX62" fmla="*/ 641356 w 1061407"/>
+                <a:gd name="connsiteY62" fmla="*/ 330740 h 989892"/>
+              </a:gdLst>
+              <a:ahLst/>
+              <a:cxnLst>
+                <a:cxn ang="0">
+                  <a:pos x="connsiteX0" y="connsiteY0"/>
+                </a:cxn>
+                <a:cxn ang="0">
+                  <a:pos x="connsiteX1" y="connsiteY1"/>
+                </a:cxn>
+                <a:cxn ang="0">
+                  <a:pos x="connsiteX2" y="connsiteY2"/>
+                </a:cxn>
+                <a:cxn ang="0">
+                  <a:pos x="connsiteX3" y="connsiteY3"/>
+                </a:cxn>
+                <a:cxn ang="0">
+                  <a:pos x="connsiteX4" y="connsiteY4"/>
+                </a:cxn>
+                <a:cxn ang="0">
+                  <a:pos x="connsiteX5" y="connsiteY5"/>
+                </a:cxn>
+                <a:cxn ang="0">
+                  <a:pos x="connsiteX6" y="connsiteY6"/>
+                </a:cxn>
+                <a:cxn ang="0">
+                  <a:pos x="connsiteX7" y="connsiteY7"/>
+                </a:cxn>
+                <a:cxn ang="0">
+                  <a:pos x="connsiteX8" y="connsiteY8"/>
+                </a:cxn>
+                <a:cxn ang="0">
+                  <a:pos x="connsiteX9" y="connsiteY9"/>
+                </a:cxn>
+                <a:cxn ang="0">
+                  <a:pos x="connsiteX10" y="connsiteY10"/>
+                </a:cxn>
+                <a:cxn ang="0">
+                  <a:pos x="connsiteX11" y="connsiteY11"/>
+                </a:cxn>
+                <a:cxn ang="0">
+                  <a:pos x="connsiteX12" y="connsiteY12"/>
+                </a:cxn>
+                <a:cxn ang="0">
+                  <a:pos x="connsiteX13" y="connsiteY13"/>
+                </a:cxn>
+                <a:cxn ang="0">
+                  <a:pos x="connsiteX14" y="connsiteY14"/>
+                </a:cxn>
+                <a:cxn ang="0">
+                  <a:pos x="connsiteX15" y="connsiteY15"/>
+                </a:cxn>
+                <a:cxn ang="0">
+                  <a:pos x="connsiteX16" y="connsiteY16"/>
+                </a:cxn>
+                <a:cxn ang="0">
+                  <a:pos x="connsiteX17" y="connsiteY17"/>
+                </a:cxn>
+                <a:cxn ang="0">
+                  <a:pos x="connsiteX18" y="connsiteY18"/>
+                </a:cxn>
+                <a:cxn ang="0">
+                  <a:pos x="connsiteX19" y="connsiteY19"/>
+                </a:cxn>
+                <a:cxn ang="0">
+                  <a:pos x="connsiteX20" y="connsiteY20"/>
+                </a:cxn>
+                <a:cxn ang="0">
+                  <a:pos x="connsiteX21" y="connsiteY21"/>
+                </a:cxn>
+                <a:cxn ang="0">
+                  <a:pos x="connsiteX22" y="connsiteY22"/>
+                </a:cxn>
+                <a:cxn ang="0">
+                  <a:pos x="connsiteX23" y="connsiteY23"/>
+                </a:cxn>
+                <a:cxn ang="0">
+                  <a:pos x="connsiteX24" y="connsiteY24"/>
+                </a:cxn>
+                <a:cxn ang="0">
+                  <a:pos x="connsiteX25" y="connsiteY25"/>
+                </a:cxn>
+                <a:cxn ang="0">
+                  <a:pos x="connsiteX26" y="connsiteY26"/>
+                </a:cxn>
+                <a:cxn ang="0">
+                  <a:pos x="connsiteX27" y="connsiteY27"/>
+                </a:cxn>
+                <a:cxn ang="0">
+                  <a:pos x="connsiteX28" y="connsiteY28"/>
+                </a:cxn>
+                <a:cxn ang="0">
+                  <a:pos x="connsiteX29" y="connsiteY29"/>
+                </a:cxn>
+                <a:cxn ang="0">
+                  <a:pos x="connsiteX30" y="connsiteY30"/>
+                </a:cxn>
+                <a:cxn ang="0">
+                  <a:pos x="connsiteX31" y="connsiteY31"/>
+                </a:cxn>
+                <a:cxn ang="0">
+                  <a:pos x="connsiteX32" y="connsiteY32"/>
+                </a:cxn>
+                <a:cxn ang="0">
+                  <a:pos x="connsiteX33" y="connsiteY33"/>
+                </a:cxn>
+                <a:cxn ang="0">
+                  <a:pos x="connsiteX34" y="connsiteY34"/>
+                </a:cxn>
+                <a:cxn ang="0">
+                  <a:pos x="connsiteX35" y="connsiteY35"/>
+                </a:cxn>
+                <a:cxn ang="0">
+                  <a:pos x="connsiteX36" y="connsiteY36"/>
+                </a:cxn>
+                <a:cxn ang="0">
+                  <a:pos x="connsiteX37" y="connsiteY37"/>
+                </a:cxn>
+                <a:cxn ang="0">
+                  <a:pos x="connsiteX38" y="connsiteY38"/>
+                </a:cxn>
+                <a:cxn ang="0">
+                  <a:pos x="connsiteX39" y="connsiteY39"/>
+                </a:cxn>
+                <a:cxn ang="0">
+                  <a:pos x="connsiteX40" y="connsiteY40"/>
+                </a:cxn>
+                <a:cxn ang="0">
+                  <a:pos x="connsiteX41" y="connsiteY41"/>
+                </a:cxn>
+                <a:cxn ang="0">
+                  <a:pos x="connsiteX42" y="connsiteY42"/>
+                </a:cxn>
+                <a:cxn ang="0">
+                  <a:pos x="connsiteX43" y="connsiteY43"/>
+                </a:cxn>
+                <a:cxn ang="0">
+                  <a:pos x="connsiteX44" y="connsiteY44"/>
+                </a:cxn>
+                <a:cxn ang="0">
+                  <a:pos x="connsiteX45" y="connsiteY45"/>
+                </a:cxn>
+                <a:cxn ang="0">
+                  <a:pos x="connsiteX46" y="connsiteY46"/>
+                </a:cxn>
+                <a:cxn ang="0">
+                  <a:pos x="connsiteX47" y="connsiteY47"/>
+                </a:cxn>
+                <a:cxn ang="0">
+                  <a:pos x="connsiteX48" y="connsiteY48"/>
+                </a:cxn>
+                <a:cxn ang="0">
+                  <a:pos x="connsiteX49" y="connsiteY49"/>
+                </a:cxn>
+                <a:cxn ang="0">
+                  <a:pos x="connsiteX50" y="connsiteY50"/>
+                </a:cxn>
+                <a:cxn ang="0">
+                  <a:pos x="connsiteX51" y="connsiteY51"/>
+                </a:cxn>
+                <a:cxn ang="0">
+                  <a:pos x="connsiteX52" y="connsiteY52"/>
+                </a:cxn>
+                <a:cxn ang="0">
+                  <a:pos x="connsiteX53" y="connsiteY53"/>
+                </a:cxn>
+                <a:cxn ang="0">
+                  <a:pos x="connsiteX54" y="connsiteY54"/>
+                </a:cxn>
+                <a:cxn ang="0">
+                  <a:pos x="connsiteX55" y="connsiteY55"/>
+                </a:cxn>
+                <a:cxn ang="0">
+                  <a:pos x="connsiteX56" y="connsiteY56"/>
+                </a:cxn>
+                <a:cxn ang="0">
+                  <a:pos x="connsiteX57" y="connsiteY57"/>
+                </a:cxn>
+                <a:cxn ang="0">
+                  <a:pos x="connsiteX58" y="connsiteY58"/>
+                </a:cxn>
+                <a:cxn ang="0">
+                  <a:pos x="connsiteX59" y="connsiteY59"/>
+                </a:cxn>
+                <a:cxn ang="0">
+                  <a:pos x="connsiteX60" y="connsiteY60"/>
+                </a:cxn>
+                <a:cxn ang="0">
+                  <a:pos x="connsiteX61" y="connsiteY61"/>
+                </a:cxn>
+                <a:cxn ang="0">
+                  <a:pos x="connsiteX62" y="connsiteY62"/>
+                </a:cxn>
+              </a:cxnLst>
+              <a:rect l="l" t="t" r="r" b="b"/>
+              <a:pathLst>
+                <a:path w="1061407" h="989892">
+                  <a:moveTo>
+                    <a:pt x="641356" y="330740"/>
+                  </a:moveTo>
+                  <a:lnTo>
+                    <a:pt x="641356" y="330740"/>
+                  </a:lnTo>
+                  <a:cubicBezTo>
+                    <a:pt x="638114" y="301557"/>
+                    <a:pt x="636456" y="272154"/>
+                    <a:pt x="631629" y="243191"/>
+                  </a:cubicBezTo>
+                  <a:cubicBezTo>
+                    <a:pt x="629943" y="233077"/>
+                    <a:pt x="624718" y="223867"/>
+                    <a:pt x="621901" y="214008"/>
+                  </a:cubicBezTo>
+                  <a:cubicBezTo>
+                    <a:pt x="618228" y="201153"/>
+                    <a:pt x="615073" y="188149"/>
+                    <a:pt x="612173" y="175098"/>
+                  </a:cubicBezTo>
+                  <a:cubicBezTo>
+                    <a:pt x="608586" y="158958"/>
+                    <a:pt x="608959" y="141657"/>
+                    <a:pt x="602446" y="126460"/>
+                  </a:cubicBezTo>
+                  <a:cubicBezTo>
+                    <a:pt x="598833" y="118030"/>
+                    <a:pt x="588862" y="114050"/>
+                    <a:pt x="582990" y="107004"/>
+                  </a:cubicBezTo>
+                  <a:cubicBezTo>
+                    <a:pt x="572611" y="94549"/>
+                    <a:pt x="564578" y="80211"/>
+                    <a:pt x="553807" y="68094"/>
+                  </a:cubicBezTo>
+                  <a:cubicBezTo>
+                    <a:pt x="512419" y="21533"/>
+                    <a:pt x="516335" y="26899"/>
+                    <a:pt x="475986" y="0"/>
+                  </a:cubicBezTo>
+                  <a:cubicBezTo>
+                    <a:pt x="466258" y="3243"/>
+                    <a:pt x="454054" y="2477"/>
+                    <a:pt x="446803" y="9728"/>
+                  </a:cubicBezTo>
+                  <a:cubicBezTo>
+                    <a:pt x="439553" y="16979"/>
+                    <a:pt x="442352" y="30118"/>
+                    <a:pt x="437076" y="38911"/>
+                  </a:cubicBezTo>
+                  <a:cubicBezTo>
+                    <a:pt x="432357" y="46775"/>
+                    <a:pt x="424105" y="51881"/>
+                    <a:pt x="417620" y="58366"/>
+                  </a:cubicBezTo>
+                  <a:cubicBezTo>
+                    <a:pt x="386316" y="152285"/>
+                    <a:pt x="436509" y="6281"/>
+                    <a:pt x="388437" y="126460"/>
+                  </a:cubicBezTo>
+                  <a:cubicBezTo>
+                    <a:pt x="380821" y="145501"/>
+                    <a:pt x="375467" y="165370"/>
+                    <a:pt x="368982" y="184825"/>
+                  </a:cubicBezTo>
+                  <a:lnTo>
+                    <a:pt x="349527" y="243191"/>
+                  </a:lnTo>
+                  <a:cubicBezTo>
+                    <a:pt x="342596" y="263985"/>
+                    <a:pt x="340926" y="288897"/>
+                    <a:pt x="310616" y="291830"/>
+                  </a:cubicBezTo>
+                  <a:cubicBezTo>
+                    <a:pt x="220189" y="300581"/>
+                    <a:pt x="129033" y="298315"/>
+                    <a:pt x="38242" y="301557"/>
+                  </a:cubicBezTo>
+                  <a:cubicBezTo>
+                    <a:pt x="-25080" y="364879"/>
+                    <a:pt x="3833" y="326347"/>
+                    <a:pt x="28514" y="515566"/>
+                  </a:cubicBezTo>
+                  <a:cubicBezTo>
+                    <a:pt x="30026" y="527159"/>
+                    <a:pt x="38055" y="538553"/>
+                    <a:pt x="47969" y="544749"/>
+                  </a:cubicBezTo>
+                  <a:cubicBezTo>
+                    <a:pt x="65359" y="555618"/>
+                    <a:pt x="86880" y="557719"/>
+                    <a:pt x="106335" y="564204"/>
+                  </a:cubicBezTo>
+                  <a:cubicBezTo>
+                    <a:pt x="116063" y="567447"/>
+                    <a:pt x="126986" y="568244"/>
+                    <a:pt x="135518" y="573932"/>
+                  </a:cubicBezTo>
+                  <a:cubicBezTo>
+                    <a:pt x="145246" y="580417"/>
+                    <a:pt x="153754" y="589282"/>
+                    <a:pt x="164701" y="593387"/>
+                  </a:cubicBezTo>
+                  <a:cubicBezTo>
+                    <a:pt x="180182" y="599192"/>
+                    <a:pt x="197388" y="598765"/>
+                    <a:pt x="213339" y="603115"/>
+                  </a:cubicBezTo>
+                  <a:cubicBezTo>
+                    <a:pt x="233124" y="608511"/>
+                    <a:pt x="271705" y="622570"/>
+                    <a:pt x="271705" y="622570"/>
+                  </a:cubicBezTo>
+                  <a:cubicBezTo>
+                    <a:pt x="278190" y="629055"/>
+                    <a:pt x="289653" y="632978"/>
+                    <a:pt x="291161" y="642025"/>
+                  </a:cubicBezTo>
+                  <a:cubicBezTo>
+                    <a:pt x="293359" y="655213"/>
+                    <a:pt x="286699" y="668647"/>
+                    <a:pt x="281433" y="680936"/>
+                  </a:cubicBezTo>
+                  <a:cubicBezTo>
+                    <a:pt x="272229" y="702413"/>
+                    <a:pt x="258213" y="713884"/>
+                    <a:pt x="242522" y="729574"/>
+                  </a:cubicBezTo>
+                  <a:cubicBezTo>
+                    <a:pt x="236037" y="742544"/>
+                    <a:pt x="230261" y="755894"/>
+                    <a:pt x="223067" y="768485"/>
+                  </a:cubicBezTo>
+                  <a:cubicBezTo>
+                    <a:pt x="195156" y="817329"/>
+                    <a:pt x="209351" y="777790"/>
+                    <a:pt x="184156" y="836579"/>
+                  </a:cubicBezTo>
+                  <a:cubicBezTo>
+                    <a:pt x="180117" y="846004"/>
+                    <a:pt x="177671" y="856034"/>
+                    <a:pt x="174429" y="865762"/>
+                  </a:cubicBezTo>
+                  <a:cubicBezTo>
+                    <a:pt x="177671" y="904673"/>
+                    <a:pt x="163194" y="949553"/>
+                    <a:pt x="184156" y="982494"/>
+                  </a:cubicBezTo>
+                  <a:cubicBezTo>
+                    <a:pt x="194745" y="999134"/>
+                    <a:pt x="226364" y="984077"/>
+                    <a:pt x="242522" y="972766"/>
+                  </a:cubicBezTo>
+                  <a:cubicBezTo>
+                    <a:pt x="261678" y="959357"/>
+                    <a:pt x="261978" y="927370"/>
+                    <a:pt x="281433" y="914400"/>
+                  </a:cubicBezTo>
+                  <a:cubicBezTo>
+                    <a:pt x="371255" y="854520"/>
+                    <a:pt x="260766" y="930934"/>
+                    <a:pt x="330071" y="875489"/>
+                  </a:cubicBezTo>
+                  <a:cubicBezTo>
+                    <a:pt x="339200" y="868186"/>
+                    <a:pt x="350377" y="863642"/>
+                    <a:pt x="359254" y="856034"/>
+                  </a:cubicBezTo>
+                  <a:cubicBezTo>
+                    <a:pt x="373181" y="844097"/>
+                    <a:pt x="398165" y="817123"/>
+                    <a:pt x="398165" y="817123"/>
+                  </a:cubicBezTo>
+                  <a:cubicBezTo>
+                    <a:pt x="401408" y="807395"/>
+                    <a:pt x="397758" y="789499"/>
+                    <a:pt x="407893" y="787940"/>
+                  </a:cubicBezTo>
+                  <a:cubicBezTo>
+                    <a:pt x="461568" y="779682"/>
+                    <a:pt x="512898" y="794736"/>
+                    <a:pt x="563535" y="807396"/>
+                  </a:cubicBezTo>
+                  <a:cubicBezTo>
+                    <a:pt x="573263" y="813881"/>
+                    <a:pt x="582034" y="822103"/>
+                    <a:pt x="592718" y="826851"/>
+                  </a:cubicBezTo>
+                  <a:cubicBezTo>
+                    <a:pt x="611458" y="835180"/>
+                    <a:pt x="631629" y="839821"/>
+                    <a:pt x="651084" y="846306"/>
+                  </a:cubicBezTo>
+                  <a:lnTo>
+                    <a:pt x="680267" y="856034"/>
+                  </a:lnTo>
+                  <a:cubicBezTo>
+                    <a:pt x="689995" y="859277"/>
+                    <a:pt x="700279" y="861176"/>
+                    <a:pt x="709450" y="865762"/>
+                  </a:cubicBezTo>
+                  <a:cubicBezTo>
+                    <a:pt x="757532" y="889803"/>
+                    <a:pt x="734604" y="880631"/>
+                    <a:pt x="777544" y="894945"/>
+                  </a:cubicBezTo>
+                  <a:cubicBezTo>
+                    <a:pt x="819697" y="891702"/>
+                    <a:pt x="861984" y="889886"/>
+                    <a:pt x="904003" y="885217"/>
+                  </a:cubicBezTo>
+                  <a:cubicBezTo>
+                    <a:pt x="920436" y="883391"/>
+                    <a:pt x="938286" y="883692"/>
+                    <a:pt x="952642" y="875489"/>
+                  </a:cubicBezTo>
+                  <a:cubicBezTo>
+                    <a:pt x="962793" y="869689"/>
+                    <a:pt x="965612" y="856034"/>
+                    <a:pt x="972097" y="846306"/>
+                  </a:cubicBezTo>
+                  <a:cubicBezTo>
+                    <a:pt x="968854" y="836578"/>
+                    <a:pt x="969620" y="824374"/>
+                    <a:pt x="962369" y="817123"/>
+                  </a:cubicBezTo>
+                  <a:cubicBezTo>
+                    <a:pt x="945835" y="800589"/>
+                    <a:pt x="923458" y="791183"/>
+                    <a:pt x="904003" y="778213"/>
+                  </a:cubicBezTo>
+                  <a:cubicBezTo>
+                    <a:pt x="857753" y="747380"/>
+                    <a:pt x="885918" y="762457"/>
+                    <a:pt x="816454" y="739302"/>
+                  </a:cubicBezTo>
+                  <a:lnTo>
+                    <a:pt x="787271" y="729574"/>
+                  </a:lnTo>
+                  <a:lnTo>
+                    <a:pt x="758088" y="719847"/>
+                  </a:lnTo>
+                  <a:cubicBezTo>
+                    <a:pt x="752828" y="714586"/>
+                    <a:pt x="715088" y="679388"/>
+                    <a:pt x="719178" y="671208"/>
+                  </a:cubicBezTo>
+                  <a:cubicBezTo>
+                    <a:pt x="727634" y="654297"/>
+                    <a:pt x="750905" y="650481"/>
+                    <a:pt x="767816" y="642025"/>
+                  </a:cubicBezTo>
+                  <a:cubicBezTo>
+                    <a:pt x="794739" y="628563"/>
+                    <a:pt x="825644" y="618415"/>
+                    <a:pt x="855365" y="612842"/>
+                  </a:cubicBezTo>
+                  <a:cubicBezTo>
+                    <a:pt x="894137" y="605572"/>
+                    <a:pt x="934674" y="605861"/>
+                    <a:pt x="972097" y="593387"/>
+                  </a:cubicBezTo>
+                  <a:lnTo>
+                    <a:pt x="1030463" y="573932"/>
+                  </a:lnTo>
+                  <a:cubicBezTo>
+                    <a:pt x="1036948" y="564204"/>
+                    <a:pt x="1044690" y="555206"/>
+                    <a:pt x="1049918" y="544749"/>
+                  </a:cubicBezTo>
+                  <a:cubicBezTo>
+                    <a:pt x="1064893" y="514800"/>
+                    <a:pt x="1065578" y="478791"/>
+                    <a:pt x="1049918" y="447472"/>
+                  </a:cubicBezTo>
+                  <a:cubicBezTo>
+                    <a:pt x="1045332" y="438301"/>
+                    <a:pt x="1030463" y="440987"/>
+                    <a:pt x="1020735" y="437745"/>
+                  </a:cubicBezTo>
+                  <a:cubicBezTo>
+                    <a:pt x="1014250" y="431260"/>
+                    <a:pt x="1009144" y="423008"/>
+                    <a:pt x="1001280" y="418289"/>
+                  </a:cubicBezTo>
+                  <a:cubicBezTo>
+                    <a:pt x="993271" y="413484"/>
+                    <a:pt x="937899" y="399120"/>
+                    <a:pt x="933186" y="398834"/>
+                  </a:cubicBezTo>
+                  <a:cubicBezTo>
+                    <a:pt x="839268" y="393142"/>
+                    <a:pt x="745118" y="392349"/>
+                    <a:pt x="651084" y="389106"/>
+                  </a:cubicBezTo>
+                  <a:cubicBezTo>
+                    <a:pt x="619608" y="357630"/>
+                    <a:pt x="642977" y="340468"/>
+                    <a:pt x="641356" y="330740"/>
+                  </a:cubicBezTo>
+                  <a:close/>
+                </a:path>
+              </a:pathLst>
+            </a:custGeom>
+            <a:gradFill flip="none" rotWithShape="1">
+              <a:gsLst>
+                <a:gs pos="56000">
+                  <a:srgbClr val="3C1A56"/>
+                </a:gs>
+                <a:gs pos="100000">
+                  <a:schemeClr val="bg1"/>
+                </a:gs>
+                <a:gs pos="12000">
+                  <a:srgbClr val="7030A0"/>
+                </a:gs>
+              </a:gsLst>
+              <a:path path="circle">
+                <a:fillToRect l="50000" t="50000" r="50000" b="50000"/>
+              </a:path>
+              <a:tileRect/>
+            </a:gradFill>
+            <a:ln>
+              <a:noFill/>
+            </a:ln>
+          </p:spPr>
+          <p:style>
+            <a:lnRef idx="2">
+              <a:schemeClr val="accent1">
+                <a:shade val="50000"/>
+              </a:schemeClr>
+            </a:lnRef>
+            <a:fillRef idx="1">
+              <a:schemeClr val="accent1"/>
+            </a:fillRef>
+            <a:effectRef idx="0">
+              <a:schemeClr val="accent1"/>
+            </a:effectRef>
+            <a:fontRef idx="minor">
+              <a:schemeClr val="lt1"/>
+            </a:fontRef>
+          </p:style>
+          <p:txBody>
+            <a:bodyPr rtlCol="0" anchor="ctr"/>
+            <a:lstStyle/>
+            <a:p>
+              <a:pPr algn="ctr"/>
+              <a:endParaRPr lang="en-US"/>
+            </a:p>
+          </p:txBody>
+        </p:sp>
+        <p:sp>
+          <p:nvSpPr>
+            <p:cNvPr id="23" name="Freeform: Shape 22">
+              <a:extLst>
+                <a:ext uri="{FF2B5EF4-FFF2-40B4-BE49-F238E27FC236}">
+                  <a16:creationId xmlns:a16="http://schemas.microsoft.com/office/drawing/2014/main" id="{7E0C2F84-16B6-B3CE-5677-4FE272C1B5EE}"/>
+                </a:ext>
+              </a:extLst>
+            </p:cNvPr>
+            <p:cNvSpPr/>
+            <p:nvPr/>
+          </p:nvSpPr>
+          <p:spPr>
+            <a:xfrm>
+              <a:off x="3962822" y="4044309"/>
+              <a:ext cx="134998" cy="143962"/>
+            </a:xfrm>
+            <a:custGeom>
+              <a:avLst/>
+              <a:gdLst>
+                <a:gd name="connsiteX0" fmla="*/ 84063 w 200795"/>
+                <a:gd name="connsiteY0" fmla="*/ 9846 h 214127"/>
+                <a:gd name="connsiteX1" fmla="*/ 84063 w 200795"/>
+                <a:gd name="connsiteY1" fmla="*/ 9846 h 214127"/>
+                <a:gd name="connsiteX2" fmla="*/ 6242 w 200795"/>
+                <a:gd name="connsiteY2" fmla="*/ 48757 h 214127"/>
+                <a:gd name="connsiteX3" fmla="*/ 35425 w 200795"/>
+                <a:gd name="connsiteY3" fmla="*/ 184944 h 214127"/>
+                <a:gd name="connsiteX4" fmla="*/ 93791 w 200795"/>
+                <a:gd name="connsiteY4" fmla="*/ 214127 h 214127"/>
+                <a:gd name="connsiteX5" fmla="*/ 181340 w 200795"/>
+                <a:gd name="connsiteY5" fmla="*/ 184944 h 214127"/>
+                <a:gd name="connsiteX6" fmla="*/ 200795 w 200795"/>
+                <a:gd name="connsiteY6" fmla="*/ 155761 h 214127"/>
+                <a:gd name="connsiteX7" fmla="*/ 181340 w 200795"/>
+                <a:gd name="connsiteY7" fmla="*/ 48757 h 214127"/>
+                <a:gd name="connsiteX8" fmla="*/ 161884 w 200795"/>
+                <a:gd name="connsiteY8" fmla="*/ 29301 h 214127"/>
+                <a:gd name="connsiteX9" fmla="*/ 103518 w 200795"/>
+                <a:gd name="connsiteY9" fmla="*/ 118 h 214127"/>
+                <a:gd name="connsiteX10" fmla="*/ 84063 w 200795"/>
+                <a:gd name="connsiteY10" fmla="*/ 9846 h 214127"/>
+              </a:gdLst>
+              <a:ahLst/>
+              <a:cxnLst>
+                <a:cxn ang="0">
+                  <a:pos x="connsiteX0" y="connsiteY0"/>
+                </a:cxn>
+                <a:cxn ang="0">
+                  <a:pos x="connsiteX1" y="connsiteY1"/>
+                </a:cxn>
+                <a:cxn ang="0">
+                  <a:pos x="connsiteX2" y="connsiteY2"/>
+                </a:cxn>
+                <a:cxn ang="0">
+                  <a:pos x="connsiteX3" y="connsiteY3"/>
+                </a:cxn>
+                <a:cxn ang="0">
+                  <a:pos x="connsiteX4" y="connsiteY4"/>
+                </a:cxn>
+                <a:cxn ang="0">
+                  <a:pos x="connsiteX5" y="connsiteY5"/>
+                </a:cxn>
+                <a:cxn ang="0">
+                  <a:pos x="connsiteX6" y="connsiteY6"/>
+                </a:cxn>
+                <a:cxn ang="0">
+                  <a:pos x="connsiteX7" y="connsiteY7"/>
+                </a:cxn>
+                <a:cxn ang="0">
+                  <a:pos x="connsiteX8" y="connsiteY8"/>
+                </a:cxn>
+                <a:cxn ang="0">
+                  <a:pos x="connsiteX9" y="connsiteY9"/>
+                </a:cxn>
+                <a:cxn ang="0">
+                  <a:pos x="connsiteX10" y="connsiteY10"/>
+                </a:cxn>
+              </a:cxnLst>
+              <a:rect l="l" t="t" r="r" b="b"/>
+              <a:pathLst>
+                <a:path w="200795" h="214127">
+                  <a:moveTo>
+                    <a:pt x="84063" y="9846"/>
+                  </a:moveTo>
+                  <a:lnTo>
+                    <a:pt x="84063" y="9846"/>
+                  </a:lnTo>
+                  <a:cubicBezTo>
+                    <a:pt x="58123" y="22816"/>
+                    <a:pt x="18507" y="22476"/>
+                    <a:pt x="6242" y="48757"/>
+                  </a:cubicBezTo>
+                  <a:cubicBezTo>
+                    <a:pt x="-8915" y="81235"/>
+                    <a:pt x="4570" y="154090"/>
+                    <a:pt x="35425" y="184944"/>
+                  </a:cubicBezTo>
+                  <a:cubicBezTo>
+                    <a:pt x="54282" y="203801"/>
+                    <a:pt x="70056" y="206215"/>
+                    <a:pt x="93791" y="214127"/>
+                  </a:cubicBezTo>
+                  <a:cubicBezTo>
+                    <a:pt x="132920" y="207605"/>
+                    <a:pt x="153984" y="212300"/>
+                    <a:pt x="181340" y="184944"/>
+                  </a:cubicBezTo>
+                  <a:cubicBezTo>
+                    <a:pt x="189607" y="176677"/>
+                    <a:pt x="194310" y="165489"/>
+                    <a:pt x="200795" y="155761"/>
+                  </a:cubicBezTo>
+                  <a:cubicBezTo>
+                    <a:pt x="199455" y="145039"/>
+                    <a:pt x="195545" y="72432"/>
+                    <a:pt x="181340" y="48757"/>
+                  </a:cubicBezTo>
+                  <a:cubicBezTo>
+                    <a:pt x="176621" y="40892"/>
+                    <a:pt x="169046" y="35030"/>
+                    <a:pt x="161884" y="29301"/>
+                  </a:cubicBezTo>
+                  <a:cubicBezTo>
+                    <a:pt x="142756" y="13998"/>
+                    <a:pt x="127491" y="4913"/>
+                    <a:pt x="103518" y="118"/>
+                  </a:cubicBezTo>
+                  <a:cubicBezTo>
+                    <a:pt x="97159" y="-1154"/>
+                    <a:pt x="87306" y="8225"/>
+                    <a:pt x="84063" y="9846"/>
+                  </a:cubicBezTo>
+                  <a:close/>
+                </a:path>
+              </a:pathLst>
+            </a:custGeom>
+            <a:gradFill flip="none" rotWithShape="1">
+              <a:gsLst>
+                <a:gs pos="56000">
+                  <a:srgbClr val="3C1A56"/>
+                </a:gs>
+                <a:gs pos="100000">
+                  <a:schemeClr val="bg1"/>
+                </a:gs>
+                <a:gs pos="12000">
+                  <a:srgbClr val="7030A0"/>
+                </a:gs>
+              </a:gsLst>
+              <a:path path="circle">
+                <a:fillToRect l="50000" t="50000" r="50000" b="50000"/>
+              </a:path>
+              <a:tileRect/>
+            </a:gradFill>
+            <a:ln>
+              <a:noFill/>
+            </a:ln>
+          </p:spPr>
+          <p:style>
+            <a:lnRef idx="2">
+              <a:schemeClr val="accent1">
+                <a:shade val="50000"/>
+              </a:schemeClr>
+            </a:lnRef>
+            <a:fillRef idx="1">
+              <a:schemeClr val="accent1"/>
+            </a:fillRef>
+            <a:effectRef idx="0">
+              <a:schemeClr val="accent1"/>
+            </a:effectRef>
+            <a:fontRef idx="minor">
+              <a:schemeClr val="lt1"/>
+            </a:fontRef>
+          </p:style>
+          <p:txBody>
+            <a:bodyPr rtlCol="0" anchor="ctr"/>
+            <a:lstStyle/>
+            <a:p>
+              <a:pPr algn="ctr"/>
+              <a:endParaRPr lang="en-US"/>
+            </a:p>
+          </p:txBody>
+        </p:sp>
+        <p:sp>
+          <p:nvSpPr>
+            <p:cNvPr id="32" name="Freeform: Shape 31">
+              <a:extLst>
+                <a:ext uri="{FF2B5EF4-FFF2-40B4-BE49-F238E27FC236}">
+                  <a16:creationId xmlns:a16="http://schemas.microsoft.com/office/drawing/2014/main" id="{D52C761C-9C1A-BCD7-7D63-371247671D11}"/>
+                </a:ext>
+              </a:extLst>
+            </p:cNvPr>
+            <p:cNvSpPr/>
+            <p:nvPr/>
+          </p:nvSpPr>
+          <p:spPr>
+            <a:xfrm>
+              <a:off x="4189579" y="3851495"/>
+              <a:ext cx="119847" cy="130802"/>
+            </a:xfrm>
+            <a:custGeom>
+              <a:avLst/>
+              <a:gdLst>
+                <a:gd name="connsiteX0" fmla="*/ 0 w 178259"/>
+                <a:gd name="connsiteY0" fmla="*/ 29183 h 194554"/>
+                <a:gd name="connsiteX1" fmla="*/ 0 w 178259"/>
+                <a:gd name="connsiteY1" fmla="*/ 29183 h 194554"/>
+                <a:gd name="connsiteX2" fmla="*/ 87549 w 178259"/>
+                <a:gd name="connsiteY2" fmla="*/ 9728 h 194554"/>
+                <a:gd name="connsiteX3" fmla="*/ 116732 w 178259"/>
+                <a:gd name="connsiteY3" fmla="*/ 0 h 194554"/>
+                <a:gd name="connsiteX4" fmla="*/ 145915 w 178259"/>
+                <a:gd name="connsiteY4" fmla="*/ 9728 h 194554"/>
+                <a:gd name="connsiteX5" fmla="*/ 155643 w 178259"/>
+                <a:gd name="connsiteY5" fmla="*/ 184826 h 194554"/>
+                <a:gd name="connsiteX6" fmla="*/ 126460 w 178259"/>
+                <a:gd name="connsiteY6" fmla="*/ 194554 h 194554"/>
+                <a:gd name="connsiteX7" fmla="*/ 29183 w 178259"/>
+                <a:gd name="connsiteY7" fmla="*/ 184826 h 194554"/>
+                <a:gd name="connsiteX8" fmla="*/ 19455 w 178259"/>
+                <a:gd name="connsiteY8" fmla="*/ 155643 h 194554"/>
+                <a:gd name="connsiteX9" fmla="*/ 29183 w 178259"/>
+                <a:gd name="connsiteY9" fmla="*/ 48639 h 194554"/>
+                <a:gd name="connsiteX10" fmla="*/ 0 w 178259"/>
+                <a:gd name="connsiteY10" fmla="*/ 29183 h 194554"/>
+              </a:gdLst>
+              <a:ahLst/>
+              <a:cxnLst>
+                <a:cxn ang="0">
+                  <a:pos x="connsiteX0" y="connsiteY0"/>
+                </a:cxn>
+                <a:cxn ang="0">
+                  <a:pos x="connsiteX1" y="connsiteY1"/>
+                </a:cxn>
+                <a:cxn ang="0">
+                  <a:pos x="connsiteX2" y="connsiteY2"/>
+                </a:cxn>
+                <a:cxn ang="0">
+                  <a:pos x="connsiteX3" y="connsiteY3"/>
+                </a:cxn>
+                <a:cxn ang="0">
+                  <a:pos x="connsiteX4" y="connsiteY4"/>
+                </a:cxn>
+                <a:cxn ang="0">
+                  <a:pos x="connsiteX5" y="connsiteY5"/>
+                </a:cxn>
+                <a:cxn ang="0">
+                  <a:pos x="connsiteX6" y="connsiteY6"/>
+                </a:cxn>
+                <a:cxn ang="0">
+                  <a:pos x="connsiteX7" y="connsiteY7"/>
+                </a:cxn>
+                <a:cxn ang="0">
+                  <a:pos x="connsiteX8" y="connsiteY8"/>
+                </a:cxn>
+                <a:cxn ang="0">
+                  <a:pos x="connsiteX9" y="connsiteY9"/>
+                </a:cxn>
+                <a:cxn ang="0">
+                  <a:pos x="connsiteX10" y="connsiteY10"/>
+                </a:cxn>
+              </a:cxnLst>
+              <a:rect l="l" t="t" r="r" b="b"/>
+              <a:pathLst>
+                <a:path w="178259" h="194554">
+                  <a:moveTo>
+                    <a:pt x="0" y="29183"/>
+                  </a:moveTo>
+                  <a:lnTo>
+                    <a:pt x="0" y="29183"/>
+                  </a:lnTo>
+                  <a:cubicBezTo>
+                    <a:pt x="29183" y="22698"/>
+                    <a:pt x="58547" y="16979"/>
+                    <a:pt x="87549" y="9728"/>
+                  </a:cubicBezTo>
+                  <a:cubicBezTo>
+                    <a:pt x="97497" y="7241"/>
+                    <a:pt x="106478" y="0"/>
+                    <a:pt x="116732" y="0"/>
+                  </a:cubicBezTo>
+                  <a:cubicBezTo>
+                    <a:pt x="126986" y="0"/>
+                    <a:pt x="136187" y="6485"/>
+                    <a:pt x="145915" y="9728"/>
+                  </a:cubicBezTo>
+                  <a:cubicBezTo>
+                    <a:pt x="187370" y="71912"/>
+                    <a:pt x="187158" y="58762"/>
+                    <a:pt x="155643" y="184826"/>
+                  </a:cubicBezTo>
+                  <a:cubicBezTo>
+                    <a:pt x="153156" y="194774"/>
+                    <a:pt x="136188" y="191311"/>
+                    <a:pt x="126460" y="194554"/>
+                  </a:cubicBezTo>
+                  <a:cubicBezTo>
+                    <a:pt x="94034" y="191311"/>
+                    <a:pt x="59808" y="195963"/>
+                    <a:pt x="29183" y="184826"/>
+                  </a:cubicBezTo>
+                  <a:cubicBezTo>
+                    <a:pt x="19546" y="181322"/>
+                    <a:pt x="19455" y="165897"/>
+                    <a:pt x="19455" y="155643"/>
+                  </a:cubicBezTo>
+                  <a:cubicBezTo>
+                    <a:pt x="19455" y="119828"/>
+                    <a:pt x="26436" y="84349"/>
+                    <a:pt x="29183" y="48639"/>
+                  </a:cubicBezTo>
+                  <a:cubicBezTo>
+                    <a:pt x="29680" y="42173"/>
+                    <a:pt x="4864" y="32426"/>
+                    <a:pt x="0" y="29183"/>
+                  </a:cubicBezTo>
+                  <a:close/>
+                </a:path>
+              </a:pathLst>
+            </a:custGeom>
+            <a:gradFill flip="none" rotWithShape="1">
+              <a:gsLst>
+                <a:gs pos="56000">
+                  <a:srgbClr val="3C1A56"/>
+                </a:gs>
+                <a:gs pos="100000">
+                  <a:schemeClr val="bg1"/>
+                </a:gs>
+                <a:gs pos="12000">
+                  <a:srgbClr val="7030A0"/>
+                </a:gs>
+              </a:gsLst>
+              <a:path path="circle">
+                <a:fillToRect l="50000" t="50000" r="50000" b="50000"/>
+              </a:path>
+              <a:tileRect/>
+            </a:gradFill>
+            <a:ln>
+              <a:noFill/>
+            </a:ln>
+          </p:spPr>
+          <p:style>
+            <a:lnRef idx="2">
+              <a:schemeClr val="accent1">
+                <a:shade val="50000"/>
+              </a:schemeClr>
+            </a:lnRef>
+            <a:fillRef idx="1">
+              <a:schemeClr val="accent1"/>
+            </a:fillRef>
+            <a:effectRef idx="0">
+              <a:schemeClr val="accent1"/>
+            </a:effectRef>
+            <a:fontRef idx="minor">
+              <a:schemeClr val="lt1"/>
+            </a:fontRef>
+          </p:style>
+          <p:txBody>
+            <a:bodyPr rtlCol="0" anchor="ctr"/>
+            <a:lstStyle/>
+            <a:p>
+              <a:pPr algn="ctr"/>
+              <a:endParaRPr lang="en-US"/>
+            </a:p>
+          </p:txBody>
+        </p:sp>
+        <p:sp>
+          <p:nvSpPr>
+            <p:cNvPr id="33" name="Freeform: Shape 32">
+              <a:extLst>
+                <a:ext uri="{FF2B5EF4-FFF2-40B4-BE49-F238E27FC236}">
+                  <a16:creationId xmlns:a16="http://schemas.microsoft.com/office/drawing/2014/main" id="{76ACB273-B6F9-F108-F8F1-FE7AFDC86574}"/>
+                </a:ext>
+              </a:extLst>
+            </p:cNvPr>
+            <p:cNvSpPr/>
+            <p:nvPr/>
+          </p:nvSpPr>
+          <p:spPr>
+            <a:xfrm>
+              <a:off x="4213879" y="4175231"/>
+              <a:ext cx="130802" cy="137342"/>
+            </a:xfrm>
+            <a:custGeom>
+              <a:avLst/>
+              <a:gdLst>
+                <a:gd name="connsiteX0" fmla="*/ 87549 w 194553"/>
+                <a:gd name="connsiteY0" fmla="*/ 0 h 204281"/>
+                <a:gd name="connsiteX1" fmla="*/ 87549 w 194553"/>
+                <a:gd name="connsiteY1" fmla="*/ 0 h 204281"/>
+                <a:gd name="connsiteX2" fmla="*/ 0 w 194553"/>
+                <a:gd name="connsiteY2" fmla="*/ 107004 h 204281"/>
+                <a:gd name="connsiteX3" fmla="*/ 9727 w 194553"/>
+                <a:gd name="connsiteY3" fmla="*/ 204281 h 204281"/>
+                <a:gd name="connsiteX4" fmla="*/ 145914 w 194553"/>
+                <a:gd name="connsiteY4" fmla="*/ 184825 h 204281"/>
+                <a:gd name="connsiteX5" fmla="*/ 194553 w 194553"/>
+                <a:gd name="connsiteY5" fmla="*/ 155642 h 204281"/>
+                <a:gd name="connsiteX6" fmla="*/ 175097 w 194553"/>
+                <a:gd name="connsiteY6" fmla="*/ 68093 h 204281"/>
+                <a:gd name="connsiteX7" fmla="*/ 116731 w 194553"/>
+                <a:gd name="connsiteY7" fmla="*/ 38910 h 204281"/>
+                <a:gd name="connsiteX8" fmla="*/ 87549 w 194553"/>
+                <a:gd name="connsiteY8" fmla="*/ 0 h 204281"/>
+              </a:gdLst>
+              <a:ahLst/>
+              <a:cxnLst>
+                <a:cxn ang="0">
+                  <a:pos x="connsiteX0" y="connsiteY0"/>
+                </a:cxn>
+                <a:cxn ang="0">
+                  <a:pos x="connsiteX1" y="connsiteY1"/>
+                </a:cxn>
+                <a:cxn ang="0">
+                  <a:pos x="connsiteX2" y="connsiteY2"/>
+                </a:cxn>
+                <a:cxn ang="0">
+                  <a:pos x="connsiteX3" y="connsiteY3"/>
+                </a:cxn>
+                <a:cxn ang="0">
+                  <a:pos x="connsiteX4" y="connsiteY4"/>
+                </a:cxn>
+                <a:cxn ang="0">
+                  <a:pos x="connsiteX5" y="connsiteY5"/>
+                </a:cxn>
+                <a:cxn ang="0">
+                  <a:pos x="connsiteX6" y="connsiteY6"/>
+                </a:cxn>
+                <a:cxn ang="0">
+                  <a:pos x="connsiteX7" y="connsiteY7"/>
+                </a:cxn>
+                <a:cxn ang="0">
+                  <a:pos x="connsiteX8" y="connsiteY8"/>
+                </a:cxn>
+              </a:cxnLst>
+              <a:rect l="l" t="t" r="r" b="b"/>
+              <a:pathLst>
+                <a:path w="194553" h="204281">
+                  <a:moveTo>
+                    <a:pt x="87549" y="0"/>
+                  </a:moveTo>
+                  <a:lnTo>
+                    <a:pt x="87549" y="0"/>
+                  </a:lnTo>
+                  <a:cubicBezTo>
+                    <a:pt x="78780" y="8769"/>
+                    <a:pt x="0" y="64345"/>
+                    <a:pt x="0" y="107004"/>
+                  </a:cubicBezTo>
+                  <a:cubicBezTo>
+                    <a:pt x="0" y="139591"/>
+                    <a:pt x="6485" y="171855"/>
+                    <a:pt x="9727" y="204281"/>
+                  </a:cubicBezTo>
+                  <a:cubicBezTo>
+                    <a:pt x="55123" y="197796"/>
+                    <a:pt x="113488" y="217250"/>
+                    <a:pt x="145914" y="184825"/>
+                  </a:cubicBezTo>
+                  <a:cubicBezTo>
+                    <a:pt x="172621" y="158120"/>
+                    <a:pt x="156669" y="168270"/>
+                    <a:pt x="194553" y="155642"/>
+                  </a:cubicBezTo>
+                  <a:cubicBezTo>
+                    <a:pt x="194453" y="155044"/>
+                    <a:pt x="185180" y="80697"/>
+                    <a:pt x="175097" y="68093"/>
+                  </a:cubicBezTo>
+                  <a:cubicBezTo>
+                    <a:pt x="164755" y="55166"/>
+                    <a:pt x="132997" y="41621"/>
+                    <a:pt x="116731" y="38910"/>
+                  </a:cubicBezTo>
+                  <a:cubicBezTo>
+                    <a:pt x="107136" y="37311"/>
+                    <a:pt x="92413" y="6485"/>
+                    <a:pt x="87549" y="0"/>
+                  </a:cubicBezTo>
+                  <a:close/>
+                </a:path>
+              </a:pathLst>
+            </a:custGeom>
+            <a:gradFill flip="none" rotWithShape="1">
+              <a:gsLst>
+                <a:gs pos="56000">
+                  <a:srgbClr val="3C1A56"/>
+                </a:gs>
+                <a:gs pos="100000">
+                  <a:schemeClr val="bg1"/>
+                </a:gs>
+                <a:gs pos="12000">
+                  <a:srgbClr val="7030A0"/>
+                </a:gs>
+              </a:gsLst>
+              <a:path path="circle">
+                <a:fillToRect l="50000" t="50000" r="50000" b="50000"/>
+              </a:path>
+              <a:tileRect/>
+            </a:gradFill>
+            <a:ln>
+              <a:noFill/>
+            </a:ln>
+          </p:spPr>
+          <p:style>
+            <a:lnRef idx="2">
+              <a:schemeClr val="accent1">
+                <a:shade val="50000"/>
+              </a:schemeClr>
+            </a:lnRef>
+            <a:fillRef idx="1">
+              <a:schemeClr val="accent1"/>
+            </a:fillRef>
+            <a:effectRef idx="0">
+              <a:schemeClr val="accent1"/>
+            </a:effectRef>
+            <a:fontRef idx="minor">
+              <a:schemeClr val="lt1"/>
+            </a:fontRef>
+          </p:style>
+          <p:txBody>
+            <a:bodyPr rtlCol="0" anchor="ctr"/>
+            <a:lstStyle/>
+            <a:p>
+              <a:pPr algn="ctr"/>
+              <a:endParaRPr lang="en-US"/>
+            </a:p>
+          </p:txBody>
+        </p:sp>
+        <p:sp>
+          <p:nvSpPr>
+            <p:cNvPr id="36" name="Freeform: Shape 35">
+              <a:extLst>
+                <a:ext uri="{FF2B5EF4-FFF2-40B4-BE49-F238E27FC236}">
+                  <a16:creationId xmlns:a16="http://schemas.microsoft.com/office/drawing/2014/main" id="{CE768172-C96A-12F5-9A31-3491869461D8}"/>
+                </a:ext>
+              </a:extLst>
+            </p:cNvPr>
+            <p:cNvSpPr/>
+            <p:nvPr/>
+          </p:nvSpPr>
+          <p:spPr>
+            <a:xfrm>
+              <a:off x="4489025" y="3894007"/>
+              <a:ext cx="143882" cy="176583"/>
+            </a:xfrm>
+            <a:custGeom>
+              <a:avLst/>
+              <a:gdLst>
+                <a:gd name="connsiteX0" fmla="*/ 0 w 214008"/>
+                <a:gd name="connsiteY0" fmla="*/ 136188 h 262647"/>
+                <a:gd name="connsiteX1" fmla="*/ 0 w 214008"/>
+                <a:gd name="connsiteY1" fmla="*/ 136188 h 262647"/>
+                <a:gd name="connsiteX2" fmla="*/ 9728 w 214008"/>
+                <a:gd name="connsiteY2" fmla="*/ 48639 h 262647"/>
+                <a:gd name="connsiteX3" fmla="*/ 38911 w 214008"/>
+                <a:gd name="connsiteY3" fmla="*/ 38911 h 262647"/>
+                <a:gd name="connsiteX4" fmla="*/ 77821 w 214008"/>
+                <a:gd name="connsiteY4" fmla="*/ 19456 h 262647"/>
+                <a:gd name="connsiteX5" fmla="*/ 116732 w 214008"/>
+                <a:gd name="connsiteY5" fmla="*/ 9728 h 262647"/>
+                <a:gd name="connsiteX6" fmla="*/ 145915 w 214008"/>
+                <a:gd name="connsiteY6" fmla="*/ 0 h 262647"/>
+                <a:gd name="connsiteX7" fmla="*/ 175098 w 214008"/>
+                <a:gd name="connsiteY7" fmla="*/ 9728 h 262647"/>
+                <a:gd name="connsiteX8" fmla="*/ 214008 w 214008"/>
+                <a:gd name="connsiteY8" fmla="*/ 68094 h 262647"/>
+                <a:gd name="connsiteX9" fmla="*/ 204281 w 214008"/>
+                <a:gd name="connsiteY9" fmla="*/ 223737 h 262647"/>
+                <a:gd name="connsiteX10" fmla="*/ 184825 w 214008"/>
+                <a:gd name="connsiteY10" fmla="*/ 243192 h 262647"/>
+                <a:gd name="connsiteX11" fmla="*/ 126459 w 214008"/>
+                <a:gd name="connsiteY11" fmla="*/ 262647 h 262647"/>
+                <a:gd name="connsiteX12" fmla="*/ 87549 w 214008"/>
+                <a:gd name="connsiteY12" fmla="*/ 252920 h 262647"/>
+                <a:gd name="connsiteX13" fmla="*/ 68093 w 214008"/>
+                <a:gd name="connsiteY13" fmla="*/ 233464 h 262647"/>
+                <a:gd name="connsiteX14" fmla="*/ 19455 w 214008"/>
+                <a:gd name="connsiteY14" fmla="*/ 145915 h 262647"/>
+                <a:gd name="connsiteX15" fmla="*/ 0 w 214008"/>
+                <a:gd name="connsiteY15" fmla="*/ 136188 h 262647"/>
+              </a:gdLst>
+              <a:ahLst/>
+              <a:cxnLst>
+                <a:cxn ang="0">
+                  <a:pos x="connsiteX0" y="connsiteY0"/>
+                </a:cxn>
+                <a:cxn ang="0">
+                  <a:pos x="connsiteX1" y="connsiteY1"/>
+                </a:cxn>
+                <a:cxn ang="0">
+                  <a:pos x="connsiteX2" y="connsiteY2"/>
+                </a:cxn>
+                <a:cxn ang="0">
+                  <a:pos x="connsiteX3" y="connsiteY3"/>
+                </a:cxn>
+                <a:cxn ang="0">
+                  <a:pos x="connsiteX4" y="connsiteY4"/>
+                </a:cxn>
+                <a:cxn ang="0">
+                  <a:pos x="connsiteX5" y="connsiteY5"/>
+                </a:cxn>
+                <a:cxn ang="0">
+                  <a:pos x="connsiteX6" y="connsiteY6"/>
+                </a:cxn>
+                <a:cxn ang="0">
+                  <a:pos x="connsiteX7" y="connsiteY7"/>
+                </a:cxn>
+                <a:cxn ang="0">
+                  <a:pos x="connsiteX8" y="connsiteY8"/>
+                </a:cxn>
+                <a:cxn ang="0">
+                  <a:pos x="connsiteX9" y="connsiteY9"/>
+                </a:cxn>
+                <a:cxn ang="0">
+                  <a:pos x="connsiteX10" y="connsiteY10"/>
+                </a:cxn>
+                <a:cxn ang="0">
+                  <a:pos x="connsiteX11" y="connsiteY11"/>
+                </a:cxn>
+                <a:cxn ang="0">
+                  <a:pos x="connsiteX12" y="connsiteY12"/>
+                </a:cxn>
+                <a:cxn ang="0">
+                  <a:pos x="connsiteX13" y="connsiteY13"/>
+                </a:cxn>
+                <a:cxn ang="0">
+                  <a:pos x="connsiteX14" y="connsiteY14"/>
+                </a:cxn>
+                <a:cxn ang="0">
+                  <a:pos x="connsiteX15" y="connsiteY15"/>
+                </a:cxn>
+              </a:cxnLst>
+              <a:rect l="l" t="t" r="r" b="b"/>
+              <a:pathLst>
+                <a:path w="214008" h="262647">
+                  <a:moveTo>
+                    <a:pt x="0" y="136188"/>
+                  </a:moveTo>
+                  <a:lnTo>
+                    <a:pt x="0" y="136188"/>
+                  </a:lnTo>
+                  <a:cubicBezTo>
+                    <a:pt x="3243" y="107005"/>
+                    <a:pt x="-1177" y="75901"/>
+                    <a:pt x="9728" y="48639"/>
+                  </a:cubicBezTo>
+                  <a:cubicBezTo>
+                    <a:pt x="13536" y="39119"/>
+                    <a:pt x="29486" y="42950"/>
+                    <a:pt x="38911" y="38911"/>
+                  </a:cubicBezTo>
+                  <a:cubicBezTo>
+                    <a:pt x="52239" y="33199"/>
+                    <a:pt x="64243" y="24548"/>
+                    <a:pt x="77821" y="19456"/>
+                  </a:cubicBezTo>
+                  <a:cubicBezTo>
+                    <a:pt x="90339" y="14762"/>
+                    <a:pt x="103877" y="13401"/>
+                    <a:pt x="116732" y="9728"/>
+                  </a:cubicBezTo>
+                  <a:cubicBezTo>
+                    <a:pt x="126591" y="6911"/>
+                    <a:pt x="136187" y="3243"/>
+                    <a:pt x="145915" y="0"/>
+                  </a:cubicBezTo>
+                  <a:cubicBezTo>
+                    <a:pt x="155643" y="3243"/>
+                    <a:pt x="167847" y="2477"/>
+                    <a:pt x="175098" y="9728"/>
+                  </a:cubicBezTo>
+                  <a:cubicBezTo>
+                    <a:pt x="191632" y="26262"/>
+                    <a:pt x="214008" y="68094"/>
+                    <a:pt x="214008" y="68094"/>
+                  </a:cubicBezTo>
+                  <a:cubicBezTo>
+                    <a:pt x="210766" y="119975"/>
+                    <a:pt x="212827" y="172462"/>
+                    <a:pt x="204281" y="223737"/>
+                  </a:cubicBezTo>
+                  <a:cubicBezTo>
+                    <a:pt x="202773" y="232784"/>
+                    <a:pt x="193028" y="239091"/>
+                    <a:pt x="184825" y="243192"/>
+                  </a:cubicBezTo>
+                  <a:cubicBezTo>
+                    <a:pt x="166482" y="252363"/>
+                    <a:pt x="126459" y="262647"/>
+                    <a:pt x="126459" y="262647"/>
+                  </a:cubicBezTo>
+                  <a:cubicBezTo>
+                    <a:pt x="113489" y="259405"/>
+                    <a:pt x="99507" y="258899"/>
+                    <a:pt x="87549" y="252920"/>
+                  </a:cubicBezTo>
+                  <a:cubicBezTo>
+                    <a:pt x="79346" y="248818"/>
+                    <a:pt x="73596" y="240801"/>
+                    <a:pt x="68093" y="233464"/>
+                  </a:cubicBezTo>
+                  <a:cubicBezTo>
+                    <a:pt x="40924" y="197239"/>
+                    <a:pt x="28934" y="183829"/>
+                    <a:pt x="19455" y="145915"/>
+                  </a:cubicBezTo>
+                  <a:cubicBezTo>
+                    <a:pt x="18669" y="142769"/>
+                    <a:pt x="3242" y="137809"/>
+                    <a:pt x="0" y="136188"/>
+                  </a:cubicBezTo>
+                  <a:close/>
+                </a:path>
+              </a:pathLst>
+            </a:custGeom>
+            <a:gradFill flip="none" rotWithShape="1">
+              <a:gsLst>
+                <a:gs pos="56000">
+                  <a:srgbClr val="3C1A56"/>
+                </a:gs>
+                <a:gs pos="100000">
+                  <a:schemeClr val="bg1"/>
+                </a:gs>
+                <a:gs pos="12000">
+                  <a:srgbClr val="7030A0"/>
+                </a:gs>
+              </a:gsLst>
+              <a:path path="circle">
+                <a:fillToRect l="50000" t="50000" r="50000" b="50000"/>
+              </a:path>
+              <a:tileRect/>
+            </a:gradFill>
+            <a:ln>
+              <a:noFill/>
+            </a:ln>
+          </p:spPr>
+          <p:style>
+            <a:lnRef idx="2">
+              <a:schemeClr val="accent1">
+                <a:shade val="50000"/>
+              </a:schemeClr>
+            </a:lnRef>
+            <a:fillRef idx="1">
+              <a:schemeClr val="accent1"/>
+            </a:fillRef>
+            <a:effectRef idx="0">
+              <a:schemeClr val="accent1"/>
+            </a:effectRef>
+            <a:fontRef idx="minor">
+              <a:schemeClr val="lt1"/>
+            </a:fontRef>
+          </p:style>
+          <p:txBody>
+            <a:bodyPr rtlCol="0" anchor="ctr"/>
+            <a:lstStyle/>
+            <a:p>
+              <a:pPr algn="ctr"/>
+              <a:endParaRPr lang="en-US"/>
+            </a:p>
+          </p:txBody>
+        </p:sp>
+        <p:sp>
+          <p:nvSpPr>
+            <p:cNvPr id="37" name="Freeform: Shape 36">
+              <a:extLst>
+                <a:ext uri="{FF2B5EF4-FFF2-40B4-BE49-F238E27FC236}">
+                  <a16:creationId xmlns:a16="http://schemas.microsoft.com/office/drawing/2014/main" id="{DD98FA47-1B3F-8930-26C8-BEF6D3311492}"/>
+                </a:ext>
+              </a:extLst>
+            </p:cNvPr>
+            <p:cNvSpPr/>
+            <p:nvPr/>
+          </p:nvSpPr>
+          <p:spPr>
+            <a:xfrm>
+              <a:off x="3329165" y="4319114"/>
+              <a:ext cx="354701" cy="490506"/>
+            </a:xfrm>
+            <a:custGeom>
+              <a:avLst/>
+              <a:gdLst>
+                <a:gd name="connsiteX0" fmla="*/ 272374 w 527578"/>
+                <a:gd name="connsiteY0" fmla="*/ 0 h 729574"/>
+                <a:gd name="connsiteX1" fmla="*/ 272374 w 527578"/>
+                <a:gd name="connsiteY1" fmla="*/ 0 h 729574"/>
+                <a:gd name="connsiteX2" fmla="*/ 214008 w 527578"/>
+                <a:gd name="connsiteY2" fmla="*/ 136187 h 729574"/>
+                <a:gd name="connsiteX3" fmla="*/ 145915 w 527578"/>
+                <a:gd name="connsiteY3" fmla="*/ 408561 h 729574"/>
+                <a:gd name="connsiteX4" fmla="*/ 126459 w 527578"/>
+                <a:gd name="connsiteY4" fmla="*/ 466927 h 729574"/>
+                <a:gd name="connsiteX5" fmla="*/ 107004 w 527578"/>
+                <a:gd name="connsiteY5" fmla="*/ 505838 h 729574"/>
+                <a:gd name="connsiteX6" fmla="*/ 87549 w 527578"/>
+                <a:gd name="connsiteY6" fmla="*/ 583659 h 729574"/>
+                <a:gd name="connsiteX7" fmla="*/ 38910 w 527578"/>
+                <a:gd name="connsiteY7" fmla="*/ 661481 h 729574"/>
+                <a:gd name="connsiteX8" fmla="*/ 19455 w 527578"/>
+                <a:gd name="connsiteY8" fmla="*/ 700391 h 729574"/>
+                <a:gd name="connsiteX9" fmla="*/ 0 w 527578"/>
+                <a:gd name="connsiteY9" fmla="*/ 729574 h 729574"/>
+                <a:gd name="connsiteX10" fmla="*/ 38910 w 527578"/>
+                <a:gd name="connsiteY10" fmla="*/ 642025 h 729574"/>
+                <a:gd name="connsiteX11" fmla="*/ 77821 w 527578"/>
+                <a:gd name="connsiteY11" fmla="*/ 583659 h 729574"/>
+                <a:gd name="connsiteX12" fmla="*/ 107004 w 527578"/>
+                <a:gd name="connsiteY12" fmla="*/ 573932 h 729574"/>
+                <a:gd name="connsiteX13" fmla="*/ 116732 w 527578"/>
+                <a:gd name="connsiteY13" fmla="*/ 544749 h 729574"/>
+                <a:gd name="connsiteX14" fmla="*/ 204281 w 527578"/>
+                <a:gd name="connsiteY14" fmla="*/ 515566 h 729574"/>
+                <a:gd name="connsiteX15" fmla="*/ 496110 w 527578"/>
+                <a:gd name="connsiteY15" fmla="*/ 505838 h 729574"/>
+                <a:gd name="connsiteX16" fmla="*/ 525293 w 527578"/>
+                <a:gd name="connsiteY16" fmla="*/ 389106 h 729574"/>
+                <a:gd name="connsiteX17" fmla="*/ 496110 w 527578"/>
+                <a:gd name="connsiteY17" fmla="*/ 243191 h 729574"/>
+                <a:gd name="connsiteX18" fmla="*/ 466927 w 527578"/>
+                <a:gd name="connsiteY18" fmla="*/ 233464 h 729574"/>
+                <a:gd name="connsiteX19" fmla="*/ 369651 w 527578"/>
+                <a:gd name="connsiteY19" fmla="*/ 214008 h 729574"/>
+                <a:gd name="connsiteX20" fmla="*/ 369651 w 527578"/>
+                <a:gd name="connsiteY20" fmla="*/ 58366 h 729574"/>
+                <a:gd name="connsiteX21" fmla="*/ 350196 w 527578"/>
+                <a:gd name="connsiteY21" fmla="*/ 29183 h 729574"/>
+                <a:gd name="connsiteX22" fmla="*/ 321013 w 527578"/>
+                <a:gd name="connsiteY22" fmla="*/ 19455 h 729574"/>
+                <a:gd name="connsiteX23" fmla="*/ 272374 w 527578"/>
+                <a:gd name="connsiteY23" fmla="*/ 0 h 729574"/>
+              </a:gdLst>
+              <a:ahLst/>
+              <a:cxnLst>
+                <a:cxn ang="0">
+                  <a:pos x="connsiteX0" y="connsiteY0"/>
+                </a:cxn>
+                <a:cxn ang="0">
+                  <a:pos x="connsiteX1" y="connsiteY1"/>
+                </a:cxn>
+                <a:cxn ang="0">
+                  <a:pos x="connsiteX2" y="connsiteY2"/>
+                </a:cxn>
+                <a:cxn ang="0">
+                  <a:pos x="connsiteX3" y="connsiteY3"/>
+                </a:cxn>
+                <a:cxn ang="0">
+                  <a:pos x="connsiteX4" y="connsiteY4"/>
+                </a:cxn>
+                <a:cxn ang="0">
+                  <a:pos x="connsiteX5" y="connsiteY5"/>
+                </a:cxn>
+                <a:cxn ang="0">
+                  <a:pos x="connsiteX6" y="connsiteY6"/>
+                </a:cxn>
+                <a:cxn ang="0">
+                  <a:pos x="connsiteX7" y="connsiteY7"/>
+                </a:cxn>
+                <a:cxn ang="0">
+                  <a:pos x="connsiteX8" y="connsiteY8"/>
+                </a:cxn>
+                <a:cxn ang="0">
+                  <a:pos x="connsiteX9" y="connsiteY9"/>
+                </a:cxn>
+                <a:cxn ang="0">
+                  <a:pos x="connsiteX10" y="connsiteY10"/>
+                </a:cxn>
+                <a:cxn ang="0">
+                  <a:pos x="connsiteX11" y="connsiteY11"/>
+                </a:cxn>
+                <a:cxn ang="0">
+                  <a:pos x="connsiteX12" y="connsiteY12"/>
+                </a:cxn>
+                <a:cxn ang="0">
+                  <a:pos x="connsiteX13" y="connsiteY13"/>
+                </a:cxn>
+                <a:cxn ang="0">
+                  <a:pos x="connsiteX14" y="connsiteY14"/>
+                </a:cxn>
+                <a:cxn ang="0">
+                  <a:pos x="connsiteX15" y="connsiteY15"/>
+                </a:cxn>
+                <a:cxn ang="0">
+                  <a:pos x="connsiteX16" y="connsiteY16"/>
+                </a:cxn>
+                <a:cxn ang="0">
+                  <a:pos x="connsiteX17" y="connsiteY17"/>
+                </a:cxn>
+                <a:cxn ang="0">
+                  <a:pos x="connsiteX18" y="connsiteY18"/>
+                </a:cxn>
+                <a:cxn ang="0">
+                  <a:pos x="connsiteX19" y="connsiteY19"/>
+                </a:cxn>
+                <a:cxn ang="0">
+                  <a:pos x="connsiteX20" y="connsiteY20"/>
+                </a:cxn>
+                <a:cxn ang="0">
+                  <a:pos x="connsiteX21" y="connsiteY21"/>
+                </a:cxn>
+                <a:cxn ang="0">
+                  <a:pos x="connsiteX22" y="connsiteY22"/>
+                </a:cxn>
+                <a:cxn ang="0">
+                  <a:pos x="connsiteX23" y="connsiteY23"/>
+                </a:cxn>
+              </a:cxnLst>
+              <a:rect l="l" t="t" r="r" b="b"/>
+              <a:pathLst>
+                <a:path w="527578" h="729574">
+                  <a:moveTo>
+                    <a:pt x="272374" y="0"/>
+                  </a:moveTo>
+                  <a:lnTo>
+                    <a:pt x="272374" y="0"/>
+                  </a:lnTo>
+                  <a:cubicBezTo>
+                    <a:pt x="242007" y="60734"/>
+                    <a:pt x="230109" y="75360"/>
+                    <a:pt x="214008" y="136187"/>
+                  </a:cubicBezTo>
+                  <a:cubicBezTo>
+                    <a:pt x="190060" y="226657"/>
+                    <a:pt x="175510" y="319778"/>
+                    <a:pt x="145915" y="408561"/>
+                  </a:cubicBezTo>
+                  <a:cubicBezTo>
+                    <a:pt x="139430" y="428016"/>
+                    <a:pt x="135630" y="448584"/>
+                    <a:pt x="126459" y="466927"/>
+                  </a:cubicBezTo>
+                  <a:lnTo>
+                    <a:pt x="107004" y="505838"/>
+                  </a:lnTo>
+                  <a:cubicBezTo>
+                    <a:pt x="101296" y="534378"/>
+                    <a:pt x="98764" y="557491"/>
+                    <a:pt x="87549" y="583659"/>
+                  </a:cubicBezTo>
+                  <a:cubicBezTo>
+                    <a:pt x="60663" y="646394"/>
+                    <a:pt x="76995" y="600546"/>
+                    <a:pt x="38910" y="661481"/>
+                  </a:cubicBezTo>
+                  <a:cubicBezTo>
+                    <a:pt x="31225" y="673778"/>
+                    <a:pt x="26649" y="687801"/>
+                    <a:pt x="19455" y="700391"/>
+                  </a:cubicBezTo>
+                  <a:cubicBezTo>
+                    <a:pt x="13655" y="710542"/>
+                    <a:pt x="6485" y="719846"/>
+                    <a:pt x="0" y="729574"/>
+                  </a:cubicBezTo>
+                  <a:cubicBezTo>
+                    <a:pt x="17365" y="625380"/>
+                    <a:pt x="-7969" y="707655"/>
+                    <a:pt x="38910" y="642025"/>
+                  </a:cubicBezTo>
+                  <a:cubicBezTo>
+                    <a:pt x="56645" y="617197"/>
+                    <a:pt x="51795" y="599274"/>
+                    <a:pt x="77821" y="583659"/>
+                  </a:cubicBezTo>
+                  <a:cubicBezTo>
+                    <a:pt x="86614" y="578383"/>
+                    <a:pt x="97276" y="577174"/>
+                    <a:pt x="107004" y="573932"/>
+                  </a:cubicBezTo>
+                  <a:cubicBezTo>
+                    <a:pt x="110247" y="564204"/>
+                    <a:pt x="109481" y="552000"/>
+                    <a:pt x="116732" y="544749"/>
+                  </a:cubicBezTo>
+                  <a:cubicBezTo>
+                    <a:pt x="133603" y="527878"/>
+                    <a:pt x="183413" y="516758"/>
+                    <a:pt x="204281" y="515566"/>
+                  </a:cubicBezTo>
+                  <a:cubicBezTo>
+                    <a:pt x="301453" y="510013"/>
+                    <a:pt x="398834" y="509081"/>
+                    <a:pt x="496110" y="505838"/>
+                  </a:cubicBezTo>
+                  <a:cubicBezTo>
+                    <a:pt x="521803" y="428761"/>
+                    <a:pt x="512195" y="467701"/>
+                    <a:pt x="525293" y="389106"/>
+                  </a:cubicBezTo>
+                  <a:cubicBezTo>
+                    <a:pt x="522201" y="348902"/>
+                    <a:pt x="543869" y="271846"/>
+                    <a:pt x="496110" y="243191"/>
+                  </a:cubicBezTo>
+                  <a:cubicBezTo>
+                    <a:pt x="487317" y="237916"/>
+                    <a:pt x="476918" y="235770"/>
+                    <a:pt x="466927" y="233464"/>
+                  </a:cubicBezTo>
+                  <a:cubicBezTo>
+                    <a:pt x="434706" y="226028"/>
+                    <a:pt x="369651" y="214008"/>
+                    <a:pt x="369651" y="214008"/>
+                  </a:cubicBezTo>
+                  <a:cubicBezTo>
+                    <a:pt x="376627" y="151230"/>
+                    <a:pt x="387658" y="118389"/>
+                    <a:pt x="369651" y="58366"/>
+                  </a:cubicBezTo>
+                  <a:cubicBezTo>
+                    <a:pt x="366292" y="47168"/>
+                    <a:pt x="359325" y="36486"/>
+                    <a:pt x="350196" y="29183"/>
+                  </a:cubicBezTo>
+                  <a:cubicBezTo>
+                    <a:pt x="342189" y="22777"/>
+                    <a:pt x="330741" y="22698"/>
+                    <a:pt x="321013" y="19455"/>
+                  </a:cubicBezTo>
+                  <a:cubicBezTo>
+                    <a:pt x="292386" y="-9171"/>
+                    <a:pt x="280480" y="3242"/>
+                    <a:pt x="272374" y="0"/>
+                  </a:cubicBezTo>
+                  <a:close/>
+                </a:path>
+              </a:pathLst>
+            </a:custGeom>
+            <a:gradFill flip="none" rotWithShape="1">
+              <a:gsLst>
+                <a:gs pos="56000">
+                  <a:srgbClr val="3C1A56"/>
+                </a:gs>
+                <a:gs pos="100000">
+                  <a:schemeClr val="bg1"/>
+                </a:gs>
+                <a:gs pos="12000">
+                  <a:srgbClr val="7030A0"/>
+                </a:gs>
+              </a:gsLst>
+              <a:path path="circle">
+                <a:fillToRect l="50000" t="50000" r="50000" b="50000"/>
+              </a:path>
+              <a:tileRect/>
+            </a:gradFill>
+            <a:ln>
+              <a:noFill/>
+            </a:ln>
+          </p:spPr>
+          <p:style>
+            <a:lnRef idx="2">
+              <a:schemeClr val="accent1">
+                <a:shade val="50000"/>
+              </a:schemeClr>
+            </a:lnRef>
+            <a:fillRef idx="1">
+              <a:schemeClr val="accent1"/>
+            </a:fillRef>
+            <a:effectRef idx="0">
+              <a:schemeClr val="accent1"/>
+            </a:effectRef>
+            <a:fontRef idx="minor">
+              <a:schemeClr val="lt1"/>
+            </a:fontRef>
+          </p:style>
+          <p:txBody>
+            <a:bodyPr rtlCol="0" anchor="ctr"/>
+            <a:lstStyle/>
+            <a:p>
+              <a:pPr algn="ctr"/>
+              <a:endParaRPr lang="en-US"/>
+            </a:p>
+          </p:txBody>
+        </p:sp>
+        <p:sp>
+          <p:nvSpPr>
+            <p:cNvPr id="38" name="Moon 37">
+              <a:extLst>
+                <a:ext uri="{FF2B5EF4-FFF2-40B4-BE49-F238E27FC236}">
+                  <a16:creationId xmlns:a16="http://schemas.microsoft.com/office/drawing/2014/main" id="{3685C7BB-D0B0-139D-3EE6-EDA562F063AF}"/>
+                </a:ext>
+              </a:extLst>
+            </p:cNvPr>
+            <p:cNvSpPr/>
+            <p:nvPr/>
+          </p:nvSpPr>
+          <p:spPr>
+            <a:xfrm rot="20382263">
+              <a:off x="6126145" y="2712208"/>
+              <a:ext cx="256108" cy="351771"/>
+            </a:xfrm>
+            <a:prstGeom prst="moon">
+              <a:avLst/>
+            </a:prstGeom>
+          </p:spPr>
+          <p:style>
+            <a:lnRef idx="2">
+              <a:schemeClr val="accent1">
+                <a:shade val="50000"/>
+              </a:schemeClr>
+            </a:lnRef>
+            <a:fillRef idx="1">
+              <a:schemeClr val="accent1"/>
+            </a:fillRef>
+            <a:effectRef idx="0">
+              <a:schemeClr val="accent1"/>
+            </a:effectRef>
+            <a:fontRef idx="minor">
+              <a:schemeClr val="lt1"/>
+            </a:fontRef>
+          </p:style>
+          <p:txBody>
+            <a:bodyPr rtlCol="0" anchor="ctr"/>
+            <a:lstStyle/>
+            <a:p>
+              <a:pPr algn="ctr"/>
+              <a:endParaRPr lang="en-US"/>
+            </a:p>
+          </p:txBody>
+        </p:sp>
+        <p:cxnSp>
+          <p:nvCxnSpPr>
+            <p:cNvPr id="39" name="Straight Arrow Connector 38">
+              <a:extLst>
+                <a:ext uri="{FF2B5EF4-FFF2-40B4-BE49-F238E27FC236}">
+                  <a16:creationId xmlns:a16="http://schemas.microsoft.com/office/drawing/2014/main" id="{9431AF0B-6784-394A-E6E3-20A9D7EEDC0A}"/>
+                </a:ext>
+              </a:extLst>
+            </p:cNvPr>
+            <p:cNvCxnSpPr/>
+            <p:nvPr/>
+          </p:nvCxnSpPr>
+          <p:spPr>
+            <a:xfrm flipV="1">
+              <a:off x="4372505" y="4078976"/>
+              <a:ext cx="116520" cy="109295"/>
+            </a:xfrm>
+            <a:prstGeom prst="straightConnector1">
+              <a:avLst/>
+            </a:prstGeom>
+            <a:ln>
+              <a:tailEnd type="triangle"/>
+            </a:ln>
+          </p:spPr>
+          <p:style>
+            <a:lnRef idx="1">
+              <a:schemeClr val="accent1"/>
+            </a:lnRef>
+            <a:fillRef idx="0">
+              <a:schemeClr val="accent1"/>
+            </a:fillRef>
+            <a:effectRef idx="0">
+              <a:schemeClr val="accent1"/>
+            </a:effectRef>
+            <a:fontRef idx="minor">
+              <a:schemeClr val="tx1"/>
+            </a:fontRef>
+          </p:style>
+        </p:cxnSp>
+        <p:cxnSp>
+          <p:nvCxnSpPr>
+            <p:cNvPr id="40" name="Straight Arrow Connector 39">
+              <a:extLst>
+                <a:ext uri="{FF2B5EF4-FFF2-40B4-BE49-F238E27FC236}">
+                  <a16:creationId xmlns:a16="http://schemas.microsoft.com/office/drawing/2014/main" id="{E849D5B2-BCEC-99A6-739F-A6010B01912B}"/>
+                </a:ext>
+              </a:extLst>
+            </p:cNvPr>
+            <p:cNvCxnSpPr>
+              <a:cxnSpLocks/>
+            </p:cNvCxnSpPr>
+            <p:nvPr/>
+          </p:nvCxnSpPr>
+          <p:spPr>
+            <a:xfrm flipV="1">
+              <a:off x="3729422" y="2991810"/>
+              <a:ext cx="215301" cy="216644"/>
+            </a:xfrm>
+            <a:prstGeom prst="straightConnector1">
+              <a:avLst/>
+            </a:prstGeom>
+            <a:ln>
+              <a:tailEnd type="triangle"/>
+            </a:ln>
+          </p:spPr>
+          <p:style>
+            <a:lnRef idx="1">
+              <a:schemeClr val="accent1"/>
+            </a:lnRef>
+            <a:fillRef idx="0">
+              <a:schemeClr val="accent1"/>
+            </a:fillRef>
+            <a:effectRef idx="0">
+              <a:schemeClr val="accent1"/>
+            </a:effectRef>
+            <a:fontRef idx="minor">
+              <a:schemeClr val="tx1"/>
+            </a:fontRef>
+          </p:style>
+        </p:cxnSp>
+        <p:cxnSp>
+          <p:nvCxnSpPr>
+            <p:cNvPr id="41" name="Straight Arrow Connector 40">
+              <a:extLst>
+                <a:ext uri="{FF2B5EF4-FFF2-40B4-BE49-F238E27FC236}">
+                  <a16:creationId xmlns:a16="http://schemas.microsoft.com/office/drawing/2014/main" id="{A89CF7EF-8166-0D96-60CB-BE8B052C3FC1}"/>
+                </a:ext>
+              </a:extLst>
+            </p:cNvPr>
+            <p:cNvCxnSpPr>
+              <a:cxnSpLocks/>
+            </p:cNvCxnSpPr>
+            <p:nvPr/>
+          </p:nvCxnSpPr>
+          <p:spPr>
+            <a:xfrm flipH="1" flipV="1">
+              <a:off x="3729422" y="3616469"/>
+              <a:ext cx="255343" cy="383126"/>
+            </a:xfrm>
+            <a:prstGeom prst="straightConnector1">
+              <a:avLst/>
+            </a:prstGeom>
+            <a:ln>
+              <a:tailEnd type="triangle"/>
+            </a:ln>
+          </p:spPr>
+          <p:style>
+            <a:lnRef idx="1">
+              <a:schemeClr val="accent1"/>
+            </a:lnRef>
+            <a:fillRef idx="0">
+              <a:schemeClr val="accent1"/>
+            </a:fillRef>
+            <a:effectRef idx="0">
+              <a:schemeClr val="accent1"/>
+            </a:effectRef>
+            <a:fontRef idx="minor">
+              <a:schemeClr val="tx1"/>
+            </a:fontRef>
+          </p:style>
+        </p:cxnSp>
+        <p:cxnSp>
+          <p:nvCxnSpPr>
+            <p:cNvPr id="42" name="Straight Arrow Connector 41">
+              <a:extLst>
+                <a:ext uri="{FF2B5EF4-FFF2-40B4-BE49-F238E27FC236}">
+                  <a16:creationId xmlns:a16="http://schemas.microsoft.com/office/drawing/2014/main" id="{2508DA93-1071-5945-AB60-42684E8059F1}"/>
+                </a:ext>
+              </a:extLst>
+            </p:cNvPr>
+            <p:cNvCxnSpPr>
+              <a:cxnSpLocks/>
+            </p:cNvCxnSpPr>
+            <p:nvPr/>
+          </p:nvCxnSpPr>
+          <p:spPr>
+            <a:xfrm flipV="1">
+              <a:off x="3548868" y="3671319"/>
+              <a:ext cx="11598" cy="572582"/>
+            </a:xfrm>
+            <a:prstGeom prst="straightConnector1">
+              <a:avLst/>
+            </a:prstGeom>
+            <a:ln>
+              <a:tailEnd type="triangle"/>
+            </a:ln>
+          </p:spPr>
+          <p:style>
+            <a:lnRef idx="1">
+              <a:schemeClr val="accent1"/>
+            </a:lnRef>
+            <a:fillRef idx="0">
+              <a:schemeClr val="accent1"/>
+            </a:fillRef>
+            <a:effectRef idx="0">
+              <a:schemeClr val="accent1"/>
+            </a:effectRef>
+            <a:fontRef idx="minor">
+              <a:schemeClr val="tx1"/>
+            </a:fontRef>
+          </p:style>
+        </p:cxnSp>
+        <p:cxnSp>
+          <p:nvCxnSpPr>
+            <p:cNvPr id="43" name="Straight Arrow Connector 42">
+              <a:extLst>
+                <a:ext uri="{FF2B5EF4-FFF2-40B4-BE49-F238E27FC236}">
+                  <a16:creationId xmlns:a16="http://schemas.microsoft.com/office/drawing/2014/main" id="{60E219B3-79E7-66FF-8095-AE7909D060FE}"/>
+                </a:ext>
+              </a:extLst>
+            </p:cNvPr>
+            <p:cNvCxnSpPr>
+              <a:cxnSpLocks/>
+            </p:cNvCxnSpPr>
+            <p:nvPr/>
+          </p:nvCxnSpPr>
+          <p:spPr>
+            <a:xfrm flipH="1" flipV="1">
+              <a:off x="4236099" y="4036844"/>
+              <a:ext cx="23846" cy="103243"/>
+            </a:xfrm>
+            <a:prstGeom prst="straightConnector1">
+              <a:avLst/>
+            </a:prstGeom>
+            <a:ln>
+              <a:headEnd type="triangle" w="med" len="med"/>
+              <a:tailEnd type="none" w="med" len="med"/>
+            </a:ln>
+          </p:spPr>
+          <p:style>
+            <a:lnRef idx="1">
+              <a:schemeClr val="accent1"/>
+            </a:lnRef>
+            <a:fillRef idx="0">
+              <a:schemeClr val="accent1"/>
+            </a:fillRef>
+            <a:effectRef idx="0">
+              <a:schemeClr val="accent1"/>
+            </a:effectRef>
+            <a:fontRef idx="minor">
+              <a:schemeClr val="tx1"/>
+            </a:fontRef>
+          </p:style>
+        </p:cxnSp>
+        <p:cxnSp>
+          <p:nvCxnSpPr>
+            <p:cNvPr id="44" name="Straight Arrow Connector 43">
+              <a:extLst>
+                <a:ext uri="{FF2B5EF4-FFF2-40B4-BE49-F238E27FC236}">
+                  <a16:creationId xmlns:a16="http://schemas.microsoft.com/office/drawing/2014/main" id="{F00FC32F-E411-E5E5-50A3-355FD4C469C8}"/>
+                </a:ext>
+              </a:extLst>
+            </p:cNvPr>
+            <p:cNvCxnSpPr>
+              <a:cxnSpLocks/>
+            </p:cNvCxnSpPr>
+            <p:nvPr/>
+          </p:nvCxnSpPr>
+          <p:spPr>
+            <a:xfrm>
+              <a:off x="4341507" y="3938484"/>
+              <a:ext cx="119167" cy="19126"/>
+            </a:xfrm>
+            <a:prstGeom prst="straightConnector1">
+              <a:avLst/>
+            </a:prstGeom>
+            <a:ln>
+              <a:tailEnd type="triangle"/>
+            </a:ln>
+          </p:spPr>
+          <p:style>
+            <a:lnRef idx="1">
+              <a:schemeClr val="accent1"/>
+            </a:lnRef>
+            <a:fillRef idx="0">
+              <a:schemeClr val="accent1"/>
+            </a:fillRef>
+            <a:effectRef idx="0">
+              <a:schemeClr val="accent1"/>
+            </a:effectRef>
+            <a:fontRef idx="minor">
+              <a:schemeClr val="tx1"/>
+            </a:fontRef>
+          </p:style>
+        </p:cxnSp>
+        <p:cxnSp>
+          <p:nvCxnSpPr>
+            <p:cNvPr id="45" name="Straight Arrow Connector 44">
+              <a:extLst>
+                <a:ext uri="{FF2B5EF4-FFF2-40B4-BE49-F238E27FC236}">
+                  <a16:creationId xmlns:a16="http://schemas.microsoft.com/office/drawing/2014/main" id="{5E36FE98-71B5-A703-F9E1-5BBD387D1C89}"/>
+                </a:ext>
+              </a:extLst>
+            </p:cNvPr>
+            <p:cNvCxnSpPr>
+              <a:cxnSpLocks/>
+            </p:cNvCxnSpPr>
+            <p:nvPr/>
+          </p:nvCxnSpPr>
+          <p:spPr>
+            <a:xfrm flipV="1">
+              <a:off x="4097821" y="3977624"/>
+              <a:ext cx="66543" cy="59221"/>
+            </a:xfrm>
+            <a:prstGeom prst="straightConnector1">
+              <a:avLst/>
+            </a:prstGeom>
+            <a:ln>
+              <a:tailEnd type="triangle"/>
+            </a:ln>
+          </p:spPr>
+          <p:style>
+            <a:lnRef idx="1">
+              <a:schemeClr val="accent1"/>
+            </a:lnRef>
+            <a:fillRef idx="0">
+              <a:schemeClr val="accent1"/>
+            </a:fillRef>
+            <a:effectRef idx="0">
+              <a:schemeClr val="accent1"/>
+            </a:effectRef>
+            <a:fontRef idx="minor">
+              <a:schemeClr val="tx1"/>
+            </a:fontRef>
+          </p:style>
+        </p:cxnSp>
+        <p:grpSp>
+          <p:nvGrpSpPr>
+            <p:cNvPr id="46" name="Group 45">
+              <a:extLst>
+                <a:ext uri="{FF2B5EF4-FFF2-40B4-BE49-F238E27FC236}">
+                  <a16:creationId xmlns:a16="http://schemas.microsoft.com/office/drawing/2014/main" id="{F4EB7C8D-D94D-88E7-3917-F287EF5583F0}"/>
+                </a:ext>
+              </a:extLst>
+            </p:cNvPr>
+            <p:cNvGrpSpPr/>
+            <p:nvPr/>
+          </p:nvGrpSpPr>
+          <p:grpSpPr>
+            <a:xfrm>
+              <a:off x="5422859" y="2970375"/>
+              <a:ext cx="1018426" cy="1331084"/>
+              <a:chOff x="9722005" y="2925822"/>
+              <a:chExt cx="1514796" cy="1979841"/>
+            </a:xfrm>
+          </p:grpSpPr>
+          <p:sp>
+            <p:nvSpPr>
+              <p:cNvPr id="182" name="Star: 5 Points 181">
+                <a:extLst>
+                  <a:ext uri="{FF2B5EF4-FFF2-40B4-BE49-F238E27FC236}">
+                    <a16:creationId xmlns:a16="http://schemas.microsoft.com/office/drawing/2014/main" id="{07C5E39E-7048-7D01-118F-8D1C389AD066}"/>
+                  </a:ext>
+                </a:extLst>
+              </p:cNvPr>
+              <p:cNvSpPr/>
+              <p:nvPr/>
+            </p:nvSpPr>
+            <p:spPr>
+              <a:xfrm>
+                <a:off x="9722005" y="3163076"/>
+                <a:ext cx="683222" cy="593888"/>
+              </a:xfrm>
+              <a:prstGeom prst="star5">
+                <a:avLst/>
+              </a:prstGeom>
+            </p:spPr>
+            <p:style>
+              <a:lnRef idx="2">
+                <a:schemeClr val="accent1">
+                  <a:shade val="50000"/>
+                </a:schemeClr>
+              </a:lnRef>
+              <a:fillRef idx="1">
+                <a:schemeClr val="accent1"/>
+              </a:fillRef>
+              <a:effectRef idx="0">
+                <a:schemeClr val="accent1"/>
+              </a:effectRef>
+              <a:fontRef idx="minor">
+                <a:schemeClr val="lt1"/>
+              </a:fontRef>
+            </p:style>
+            <p:txBody>
+              <a:bodyPr rtlCol="0" anchor="ctr"/>
+              <a:lstStyle/>
+              <a:p>
+                <a:pPr algn="ctr"/>
+                <a:endParaRPr lang="en-US"/>
+              </a:p>
+            </p:txBody>
+          </p:sp>
+          <p:sp>
+            <p:nvSpPr>
+              <p:cNvPr id="183" name="Oval 182">
+                <a:extLst>
+                  <a:ext uri="{FF2B5EF4-FFF2-40B4-BE49-F238E27FC236}">
+                    <a16:creationId xmlns:a16="http://schemas.microsoft.com/office/drawing/2014/main" id="{D2343848-A3C0-AD27-82D5-FFA9DA935701}"/>
+                  </a:ext>
+                </a:extLst>
+              </p:cNvPr>
+              <p:cNvSpPr/>
+              <p:nvPr/>
+            </p:nvSpPr>
+            <p:spPr>
+              <a:xfrm>
+                <a:off x="11009383" y="4205268"/>
+                <a:ext cx="181790" cy="181790"/>
+              </a:xfrm>
+              <a:prstGeom prst="ellipse">
+                <a:avLst/>
+              </a:prstGeom>
+            </p:spPr>
+            <p:style>
+              <a:lnRef idx="2">
+                <a:schemeClr val="accent1">
+                  <a:shade val="50000"/>
+                </a:schemeClr>
+              </a:lnRef>
+              <a:fillRef idx="1">
+                <a:schemeClr val="accent1"/>
+              </a:fillRef>
+              <a:effectRef idx="0">
+                <a:schemeClr val="accent1"/>
+              </a:effectRef>
+              <a:fontRef idx="minor">
+                <a:schemeClr val="lt1"/>
+              </a:fontRef>
+            </p:style>
+            <p:txBody>
+              <a:bodyPr rtlCol="0" anchor="ctr"/>
+              <a:lstStyle/>
+              <a:p>
+                <a:pPr algn="ctr"/>
+                <a:endParaRPr lang="en-US"/>
+              </a:p>
+            </p:txBody>
+          </p:sp>
+          <p:sp>
+            <p:nvSpPr>
+              <p:cNvPr id="185" name="Oval 184">
+                <a:extLst>
+                  <a:ext uri="{FF2B5EF4-FFF2-40B4-BE49-F238E27FC236}">
+                    <a16:creationId xmlns:a16="http://schemas.microsoft.com/office/drawing/2014/main" id="{88ACBA41-E6E7-37A5-B10F-612E8FDE3CA5}"/>
+                  </a:ext>
+                </a:extLst>
+              </p:cNvPr>
+              <p:cNvSpPr/>
+              <p:nvPr/>
+            </p:nvSpPr>
+            <p:spPr>
+              <a:xfrm>
+                <a:off x="10666290" y="4516376"/>
+                <a:ext cx="181790" cy="181790"/>
+              </a:xfrm>
+              <a:prstGeom prst="ellipse">
+                <a:avLst/>
+              </a:prstGeom>
+            </p:spPr>
+            <p:style>
+              <a:lnRef idx="2">
+                <a:schemeClr val="accent1">
+                  <a:shade val="50000"/>
+                </a:schemeClr>
+              </a:lnRef>
+              <a:fillRef idx="1">
+                <a:schemeClr val="accent1"/>
+              </a:fillRef>
+              <a:effectRef idx="0">
+                <a:schemeClr val="accent1"/>
+              </a:effectRef>
+              <a:fontRef idx="minor">
+                <a:schemeClr val="lt1"/>
+              </a:fontRef>
+            </p:style>
+            <p:txBody>
+              <a:bodyPr rtlCol="0" anchor="ctr"/>
+              <a:lstStyle/>
+              <a:p>
+                <a:pPr algn="ctr"/>
+                <a:endParaRPr lang="en-US"/>
+              </a:p>
+            </p:txBody>
+          </p:sp>
+          <p:sp>
+            <p:nvSpPr>
+              <p:cNvPr id="186" name="Oval 185">
+                <a:extLst>
+                  <a:ext uri="{FF2B5EF4-FFF2-40B4-BE49-F238E27FC236}">
+                    <a16:creationId xmlns:a16="http://schemas.microsoft.com/office/drawing/2014/main" id="{2FE776E8-9C1D-190F-1AA8-6F4DE0B8ECF0}"/>
+                  </a:ext>
+                </a:extLst>
+              </p:cNvPr>
+              <p:cNvSpPr/>
+              <p:nvPr/>
+            </p:nvSpPr>
+            <p:spPr>
+              <a:xfrm>
+                <a:off x="11055011" y="4723873"/>
+                <a:ext cx="181790" cy="181790"/>
+              </a:xfrm>
+              <a:prstGeom prst="ellipse">
+                <a:avLst/>
+              </a:prstGeom>
+            </p:spPr>
+            <p:style>
+              <a:lnRef idx="2">
+                <a:schemeClr val="accent1">
+                  <a:shade val="50000"/>
+                </a:schemeClr>
+              </a:lnRef>
+              <a:fillRef idx="1">
+                <a:schemeClr val="accent1"/>
+              </a:fillRef>
+              <a:effectRef idx="0">
+                <a:schemeClr val="accent1"/>
+              </a:effectRef>
+              <a:fontRef idx="minor">
+                <a:schemeClr val="lt1"/>
+              </a:fontRef>
+            </p:style>
+            <p:txBody>
+              <a:bodyPr rtlCol="0" anchor="ctr"/>
+              <a:lstStyle/>
+              <a:p>
+                <a:pPr algn="ctr"/>
+                <a:endParaRPr lang="en-US"/>
+              </a:p>
+            </p:txBody>
+          </p:sp>
+          <p:grpSp>
+            <p:nvGrpSpPr>
+              <p:cNvPr id="187" name="Group 186">
+                <a:extLst>
+                  <a:ext uri="{FF2B5EF4-FFF2-40B4-BE49-F238E27FC236}">
+                    <a16:creationId xmlns:a16="http://schemas.microsoft.com/office/drawing/2014/main" id="{0C298E65-0EFD-C3B6-1E3E-4581E0CBDA9A}"/>
+                  </a:ext>
+                </a:extLst>
+              </p:cNvPr>
+              <p:cNvGrpSpPr/>
+              <p:nvPr/>
+            </p:nvGrpSpPr>
+            <p:grpSpPr>
+              <a:xfrm>
+                <a:off x="10348009" y="2925822"/>
+                <a:ext cx="789094" cy="1707935"/>
+                <a:chOff x="7355604" y="3217112"/>
+                <a:chExt cx="789094" cy="1707935"/>
+              </a:xfrm>
+            </p:grpSpPr>
+            <p:cxnSp>
+              <p:nvCxnSpPr>
+                <p:cNvPr id="188" name="Straight Arrow Connector 187">
+                  <a:extLst>
+                    <a:ext uri="{FF2B5EF4-FFF2-40B4-BE49-F238E27FC236}">
+                      <a16:creationId xmlns:a16="http://schemas.microsoft.com/office/drawing/2014/main" id="{E4475FB4-6542-58E9-F9E9-0BCA153FEB4E}"/>
+                    </a:ext>
+                  </a:extLst>
+                </p:cNvPr>
+                <p:cNvCxnSpPr>
+                  <a:cxnSpLocks/>
+                </p:cNvCxnSpPr>
+                <p:nvPr/>
+              </p:nvCxnSpPr>
+              <p:spPr>
+                <a:xfrm flipV="1">
+                  <a:off x="7355604" y="3217112"/>
+                  <a:ext cx="320237" cy="322234"/>
+                </a:xfrm>
+                <a:prstGeom prst="straightConnector1">
+                  <a:avLst/>
+                </a:prstGeom>
+                <a:ln>
+                  <a:tailEnd type="triangle"/>
+                </a:ln>
+              </p:spPr>
+              <p:style>
+                <a:lnRef idx="1">
+                  <a:schemeClr val="accent1"/>
+                </a:lnRef>
+                <a:fillRef idx="0">
+                  <a:schemeClr val="accent1"/>
+                </a:fillRef>
+                <a:effectRef idx="0">
+                  <a:schemeClr val="accent1"/>
+                </a:effectRef>
+                <a:fontRef idx="minor">
+                  <a:schemeClr val="tx1"/>
+                </a:fontRef>
+              </p:style>
+            </p:cxnSp>
+            <p:cxnSp>
+              <p:nvCxnSpPr>
+                <p:cNvPr id="189" name="Straight Arrow Connector 188">
+                  <a:extLst>
+                    <a:ext uri="{FF2B5EF4-FFF2-40B4-BE49-F238E27FC236}">
+                      <a16:creationId xmlns:a16="http://schemas.microsoft.com/office/drawing/2014/main" id="{D4B0CA18-967D-46C7-CC0F-E32BD5A8771F}"/>
+                    </a:ext>
+                  </a:extLst>
+                </p:cNvPr>
+                <p:cNvCxnSpPr>
+                  <a:cxnSpLocks/>
+                </p:cNvCxnSpPr>
+                <p:nvPr/>
+              </p:nvCxnSpPr>
+              <p:spPr>
+                <a:xfrm flipH="1" flipV="1">
+                  <a:off x="7355604" y="4146223"/>
+                  <a:ext cx="379795" cy="569858"/>
+                </a:xfrm>
+                <a:prstGeom prst="straightConnector1">
+                  <a:avLst/>
+                </a:prstGeom>
+                <a:ln>
+                  <a:tailEnd type="triangle"/>
+                </a:ln>
+              </p:spPr>
+              <p:style>
+                <a:lnRef idx="1">
+                  <a:schemeClr val="accent1"/>
+                </a:lnRef>
+                <a:fillRef idx="0">
+                  <a:schemeClr val="accent1"/>
+                </a:fillRef>
+                <a:effectRef idx="0">
+                  <a:schemeClr val="accent1"/>
+                </a:effectRef>
+                <a:fontRef idx="minor">
+                  <a:schemeClr val="tx1"/>
+                </a:fontRef>
+              </p:style>
+            </p:cxnSp>
+            <p:cxnSp>
+              <p:nvCxnSpPr>
+                <p:cNvPr id="190" name="Straight Arrow Connector 189">
+                  <a:extLst>
+                    <a:ext uri="{FF2B5EF4-FFF2-40B4-BE49-F238E27FC236}">
+                      <a16:creationId xmlns:a16="http://schemas.microsoft.com/office/drawing/2014/main" id="{CCF8F444-F533-D465-DA71-6C539764B62D}"/>
+                    </a:ext>
+                  </a:extLst>
+                </p:cNvPr>
+                <p:cNvCxnSpPr>
+                  <a:cxnSpLocks/>
+                </p:cNvCxnSpPr>
+                <p:nvPr/>
+              </p:nvCxnSpPr>
+              <p:spPr>
+                <a:xfrm flipH="1" flipV="1">
+                  <a:off x="8109230" y="4771485"/>
+                  <a:ext cx="35468" cy="153562"/>
+                </a:xfrm>
+                <a:prstGeom prst="straightConnector1">
+                  <a:avLst/>
+                </a:prstGeom>
+                <a:ln>
+                  <a:headEnd type="triangle" w="med" len="med"/>
+                  <a:tailEnd type="none" w="med" len="med"/>
+                </a:ln>
+              </p:spPr>
+              <p:style>
+                <a:lnRef idx="1">
+                  <a:schemeClr val="accent1"/>
+                </a:lnRef>
+                <a:fillRef idx="0">
+                  <a:schemeClr val="accent1"/>
+                </a:fillRef>
+                <a:effectRef idx="0">
+                  <a:schemeClr val="accent1"/>
+                </a:effectRef>
+                <a:fontRef idx="minor">
+                  <a:schemeClr val="tx1"/>
+                </a:fontRef>
+              </p:style>
+            </p:cxnSp>
+            <p:cxnSp>
+              <p:nvCxnSpPr>
+                <p:cNvPr id="191" name="Straight Arrow Connector 190">
+                  <a:extLst>
+                    <a:ext uri="{FF2B5EF4-FFF2-40B4-BE49-F238E27FC236}">
+                      <a16:creationId xmlns:a16="http://schemas.microsoft.com/office/drawing/2014/main" id="{EA803AE0-D94B-8C08-FBC9-F114E6B4FA9E}"/>
+                    </a:ext>
+                  </a:extLst>
+                </p:cNvPr>
+                <p:cNvCxnSpPr>
+                  <a:cxnSpLocks/>
+                </p:cNvCxnSpPr>
+                <p:nvPr/>
+              </p:nvCxnSpPr>
+              <p:spPr>
+                <a:xfrm flipV="1">
+                  <a:off x="7903556" y="4683401"/>
+                  <a:ext cx="98976" cy="88084"/>
+                </a:xfrm>
+                <a:prstGeom prst="straightConnector1">
+                  <a:avLst/>
+                </a:prstGeom>
+                <a:ln>
+                  <a:tailEnd type="triangle"/>
+                </a:ln>
+              </p:spPr>
+              <p:style>
+                <a:lnRef idx="1">
+                  <a:schemeClr val="accent1"/>
+                </a:lnRef>
+                <a:fillRef idx="0">
+                  <a:schemeClr val="accent1"/>
+                </a:fillRef>
+                <a:effectRef idx="0">
+                  <a:schemeClr val="accent1"/>
+                </a:effectRef>
+                <a:fontRef idx="minor">
+                  <a:schemeClr val="tx1"/>
+                </a:fontRef>
+              </p:style>
+            </p:cxnSp>
+          </p:grpSp>
+        </p:grpSp>
+        <p:sp>
+          <p:nvSpPr>
+            <p:cNvPr id="47" name="Arrow: Right 46">
+              <a:extLst>
+                <a:ext uri="{FF2B5EF4-FFF2-40B4-BE49-F238E27FC236}">
+                  <a16:creationId xmlns:a16="http://schemas.microsoft.com/office/drawing/2014/main" id="{A84A76C1-E5E1-3DE4-DF26-0ED1AD852F71}"/>
+                </a:ext>
+              </a:extLst>
+            </p:cNvPr>
+            <p:cNvSpPr/>
+            <p:nvPr/>
+          </p:nvSpPr>
+          <p:spPr>
+            <a:xfrm>
+              <a:off x="4667470" y="2769111"/>
+              <a:ext cx="1225807" cy="222699"/>
+            </a:xfrm>
+            <a:prstGeom prst="rightArrow">
+              <a:avLst/>
+            </a:prstGeom>
+          </p:spPr>
+          <p:style>
+            <a:lnRef idx="2">
+              <a:schemeClr val="accent2">
+                <a:shade val="50000"/>
+              </a:schemeClr>
+            </a:lnRef>
+            <a:fillRef idx="1">
+              <a:schemeClr val="accent2"/>
+            </a:fillRef>
+            <a:effectRef idx="0">
+              <a:schemeClr val="accent2"/>
+            </a:effectRef>
+            <a:fontRef idx="minor">
+              <a:schemeClr val="lt1"/>
+            </a:fontRef>
+          </p:style>
+          <p:txBody>
+            <a:bodyPr rtlCol="0" anchor="ctr"/>
+            <a:lstStyle/>
+            <a:p>
+              <a:pPr algn="ctr"/>
+              <a:endParaRPr lang="en-US"/>
+            </a:p>
+          </p:txBody>
+        </p:sp>
+        <p:cxnSp>
+          <p:nvCxnSpPr>
+            <p:cNvPr id="175" name="Straight Arrow Connector 174">
+              <a:extLst>
+                <a:ext uri="{FF2B5EF4-FFF2-40B4-BE49-F238E27FC236}">
+                  <a16:creationId xmlns:a16="http://schemas.microsoft.com/office/drawing/2014/main" id="{A4EAA5FF-110C-89D2-2231-74F4AD2E3077}"/>
+                </a:ext>
+              </a:extLst>
+            </p:cNvPr>
+            <p:cNvCxnSpPr/>
+            <p:nvPr/>
+          </p:nvCxnSpPr>
+          <p:spPr>
+            <a:xfrm>
+              <a:off x="3944724" y="3782825"/>
+              <a:ext cx="1899010" cy="0"/>
+            </a:xfrm>
+            <a:prstGeom prst="straightConnector1">
+              <a:avLst/>
+            </a:prstGeom>
+            <a:ln>
+              <a:prstDash val="dash"/>
+              <a:tailEnd type="triangle"/>
+            </a:ln>
+          </p:spPr>
+          <p:style>
+            <a:lnRef idx="1">
+              <a:schemeClr val="accent6"/>
+            </a:lnRef>
+            <a:fillRef idx="0">
+              <a:schemeClr val="accent6"/>
+            </a:fillRef>
+            <a:effectRef idx="0">
+              <a:schemeClr val="accent6"/>
+            </a:effectRef>
+            <a:fontRef idx="minor">
+              <a:schemeClr val="tx1"/>
+            </a:fontRef>
+          </p:style>
+        </p:cxnSp>
+        <p:cxnSp>
+          <p:nvCxnSpPr>
+            <p:cNvPr id="177" name="Straight Arrow Connector 176">
+              <a:extLst>
+                <a:ext uri="{FF2B5EF4-FFF2-40B4-BE49-F238E27FC236}">
+                  <a16:creationId xmlns:a16="http://schemas.microsoft.com/office/drawing/2014/main" id="{F8AC63FD-8473-4B8F-E7DC-0E3D6F2AC09A}"/>
+                </a:ext>
+              </a:extLst>
+            </p:cNvPr>
+            <p:cNvCxnSpPr/>
+            <p:nvPr/>
+          </p:nvCxnSpPr>
+          <p:spPr>
+            <a:xfrm>
+              <a:off x="3962822" y="3410042"/>
+              <a:ext cx="1391897" cy="0"/>
+            </a:xfrm>
+            <a:prstGeom prst="straightConnector1">
+              <a:avLst/>
+            </a:prstGeom>
+            <a:ln>
+              <a:prstDash val="dash"/>
+              <a:tailEnd type="triangle"/>
+            </a:ln>
+          </p:spPr>
+          <p:style>
+            <a:lnRef idx="1">
+              <a:schemeClr val="accent6"/>
+            </a:lnRef>
+            <a:fillRef idx="0">
+              <a:schemeClr val="accent6"/>
+            </a:fillRef>
+            <a:effectRef idx="0">
+              <a:schemeClr val="accent6"/>
+            </a:effectRef>
+            <a:fontRef idx="minor">
+              <a:schemeClr val="tx1"/>
+            </a:fontRef>
+          </p:style>
+        </p:cxnSp>
+        <p:cxnSp>
+          <p:nvCxnSpPr>
+            <p:cNvPr id="179" name="Straight Arrow Connector 178">
+              <a:extLst>
+                <a:ext uri="{FF2B5EF4-FFF2-40B4-BE49-F238E27FC236}">
+                  <a16:creationId xmlns:a16="http://schemas.microsoft.com/office/drawing/2014/main" id="{CC2EDC7B-9D54-B955-D402-BCFAE35375FE}"/>
+                </a:ext>
+              </a:extLst>
+            </p:cNvPr>
+            <p:cNvCxnSpPr>
+              <a:cxnSpLocks/>
+            </p:cNvCxnSpPr>
+            <p:nvPr/>
+          </p:nvCxnSpPr>
+          <p:spPr>
+            <a:xfrm>
+              <a:off x="4489025" y="4243901"/>
+              <a:ext cx="1690916" cy="0"/>
+            </a:xfrm>
+            <a:prstGeom prst="straightConnector1">
+              <a:avLst/>
+            </a:prstGeom>
+            <a:ln>
+              <a:prstDash val="dash"/>
+              <a:tailEnd type="triangle"/>
+            </a:ln>
+          </p:spPr>
+          <p:style>
+            <a:lnRef idx="1">
+              <a:schemeClr val="accent6"/>
+            </a:lnRef>
+            <a:fillRef idx="0">
+              <a:schemeClr val="accent6"/>
+            </a:fillRef>
+            <a:effectRef idx="0">
+              <a:schemeClr val="accent6"/>
+            </a:effectRef>
+            <a:fontRef idx="minor">
+              <a:schemeClr val="tx1"/>
+            </a:fontRef>
+          </p:style>
+        </p:cxnSp>
+        <p:cxnSp>
+          <p:nvCxnSpPr>
+            <p:cNvPr id="181" name="Straight Arrow Connector 180">
+              <a:extLst>
+                <a:ext uri="{FF2B5EF4-FFF2-40B4-BE49-F238E27FC236}">
+                  <a16:creationId xmlns:a16="http://schemas.microsoft.com/office/drawing/2014/main" id="{9E1DBB32-D28F-0D0B-0E6A-D735DAF1434C}"/>
+                </a:ext>
+              </a:extLst>
+            </p:cNvPr>
+            <p:cNvCxnSpPr>
+              <a:cxnSpLocks/>
+            </p:cNvCxnSpPr>
+            <p:nvPr/>
+          </p:nvCxnSpPr>
+          <p:spPr>
+            <a:xfrm>
+              <a:off x="4097820" y="4169747"/>
+              <a:ext cx="90131" cy="51884"/>
+            </a:xfrm>
+            <a:prstGeom prst="straightConnector1">
+              <a:avLst/>
+            </a:prstGeom>
+            <a:ln>
+              <a:headEnd type="triangle" w="med" len="med"/>
+              <a:tailEnd type="none" w="med" len="med"/>
+            </a:ln>
+          </p:spPr>
+          <p:style>
+            <a:lnRef idx="1">
+              <a:schemeClr val="accent1"/>
+            </a:lnRef>
+            <a:fillRef idx="0">
+              <a:schemeClr val="accent1"/>
+            </a:fillRef>
+            <a:effectRef idx="0">
+              <a:schemeClr val="accent1"/>
+            </a:effectRef>
+            <a:fontRef idx="minor">
+              <a:schemeClr val="tx1"/>
+            </a:fontRef>
+          </p:style>
+        </p:cxnSp>
+      </p:grpSp>
+    </p:spTree>
+    <p:extLst>
+      <p:ext uri="{BB962C8B-B14F-4D97-AF65-F5344CB8AC3E}">
+        <p14:creationId xmlns:p14="http://schemas.microsoft.com/office/powerpoint/2010/main" val="1490801633"/>
+      </p:ext>
+    </p:extLst>
+  </p:cSld>
+  <p:clrMapOvr>
+    <a:masterClrMapping/>
+  </p:clrMapOvr>
+</p:sld>
+</file>
+
 <file path=ppt/theme/theme1.xml><?xml version="1.0" encoding="utf-8"?>
 <a:theme xmlns:a="http://schemas.openxmlformats.org/drawingml/2006/main" name="Office Theme">
   <a:themeElements>

</xml_diff>